<commit_message>
Added the updated AGU slides. Need to practice them.
</commit_message>
<xml_diff>
--- a/reports/2020_shumko_agu_slides.pptx
+++ b/reports/2020_shumko_agu_slides.pptx
@@ -5,7 +5,7 @@
     <p:sldMasterId id="2147483648" r:id="rId1"/>
   </p:sldMasterIdLst>
   <p:notesMasterIdLst>
-    <p:notesMasterId r:id="rId11"/>
+    <p:notesMasterId r:id="rId12"/>
   </p:notesMasterIdLst>
   <p:sldIdLst>
     <p:sldId id="256" r:id="rId2"/>
@@ -17,6 +17,7 @@
     <p:sldId id="262" r:id="rId8"/>
     <p:sldId id="263" r:id="rId9"/>
     <p:sldId id="264" r:id="rId10"/>
+    <p:sldId id="265" r:id="rId11"/>
   </p:sldIdLst>
   <p:sldSz cx="12192000" cy="6858000"/>
   <p:notesSz cx="6858000" cy="9144000"/>
@@ -465,6 +466,584 @@
     </a:lvl9pPr>
   </p:notesStyle>
 </p:notesMaster>
+</file>
+
+<file path=ppt/notesSlides/notesSlide1.xml><?xml version="1.0" encoding="utf-8"?>
+<p:notes xmlns:a="http://schemas.openxmlformats.org/drawingml/2006/main" xmlns:r="http://schemas.openxmlformats.org/officeDocument/2006/relationships" xmlns:p="http://schemas.openxmlformats.org/presentationml/2006/main">
+  <p:cSld>
+    <p:spTree>
+      <p:nvGrpSpPr>
+        <p:cNvPr id="1" name=""/>
+        <p:cNvGrpSpPr/>
+        <p:nvPr/>
+      </p:nvGrpSpPr>
+      <p:grpSpPr>
+        <a:xfrm>
+          <a:off x="0" y="0"/>
+          <a:ext cx="0" cy="0"/>
+          <a:chOff x="0" y="0"/>
+          <a:chExt cx="0" cy="0"/>
+        </a:xfrm>
+      </p:grpSpPr>
+      <p:sp>
+        <p:nvSpPr>
+          <p:cNvPr id="2" name="Slide Image Placeholder 1"/>
+          <p:cNvSpPr>
+            <a:spLocks noGrp="1" noRot="1" noChangeAspect="1"/>
+          </p:cNvSpPr>
+          <p:nvPr>
+            <p:ph type="sldImg"/>
+          </p:nvPr>
+        </p:nvSpPr>
+        <p:spPr/>
+      </p:sp>
+      <p:sp>
+        <p:nvSpPr>
+          <p:cNvPr id="3" name="Notes Placeholder 2"/>
+          <p:cNvSpPr>
+            <a:spLocks noGrp="1"/>
+          </p:cNvSpPr>
+          <p:nvPr>
+            <p:ph type="body" idx="1"/>
+          </p:nvPr>
+        </p:nvSpPr>
+        <p:spPr/>
+        <p:txBody>
+          <a:bodyPr/>
+          <a:lstStyle/>
+          <a:p>
+            <a:r>
+              <a:rPr lang="en-US" dirty="0"/>
+              <a:t>Hello, my name is Mike </a:t>
+            </a:r>
+            <a:r>
+              <a:rPr lang="en-US" dirty="0" err="1"/>
+              <a:t>Shumko</a:t>
+            </a:r>
+            <a:r>
+              <a:rPr lang="en-US" dirty="0"/>
+              <a:t> and I am going to describe the statistical properties of a newly-discovered form of precipitation called curtains. One origin hypothesis was presented by Blake and O’Brien 2016 that curtains are drifting remnants of microbursts.</a:t>
+            </a:r>
+          </a:p>
+          <a:p>
+            <a:endParaRPr lang="en-US" dirty="0"/>
+          </a:p>
+          <a:p>
+            <a:r>
+              <a:rPr lang="en-US" dirty="0"/>
+              <a:t>Made possible with dual-satellite missions such as AeroCube-6, AC6, shown here. They are 0.5 U CubeSats that orbit in string-of-pearls configuration in LEO from mid-2014 to mid-2017. Both contain dosimeters, one pair of which are sensitive to &gt; 30 keV electrons.</a:t>
+            </a:r>
+          </a:p>
+          <a:p>
+            <a:endParaRPr lang="en-US" dirty="0"/>
+          </a:p>
+          <a:p>
+            <a:r>
+              <a:rPr lang="en-US" dirty="0"/>
+              <a:t>The dosimeter time series shows the differentiated dose between the two spacecraft in red and blue. One of the time series was shifted by the in-track-lag to reveal stationary curtains.</a:t>
+            </a:r>
+          </a:p>
+          <a:p>
+            <a:endParaRPr lang="en-US" dirty="0"/>
+          </a:p>
+          <a:p>
+            <a:r>
+              <a:rPr lang="en-US" dirty="0"/>
+              <a:t>As a start, this study investigated the statistical properties of ~1600 curtains to better understand what they are.</a:t>
+            </a:r>
+          </a:p>
+        </p:txBody>
+      </p:sp>
+      <p:sp>
+        <p:nvSpPr>
+          <p:cNvPr id="4" name="Slide Number Placeholder 3"/>
+          <p:cNvSpPr>
+            <a:spLocks noGrp="1"/>
+          </p:cNvSpPr>
+          <p:nvPr>
+            <p:ph type="sldNum" sz="quarter" idx="5"/>
+          </p:nvPr>
+        </p:nvSpPr>
+        <p:spPr/>
+        <p:txBody>
+          <a:bodyPr/>
+          <a:lstStyle/>
+          <a:p>
+            <a:fld id="{80735E49-1439-6B48-B6E8-4CB903FA9C2D}" type="slidenum">
+              <a:rPr lang="en-US" smtClean="0"/>
+              <a:t>1</a:t>
+            </a:fld>
+            <a:endParaRPr lang="en-US"/>
+          </a:p>
+        </p:txBody>
+      </p:sp>
+    </p:spTree>
+    <p:extLst>
+      <p:ext uri="{BB962C8B-B14F-4D97-AF65-F5344CB8AC3E}">
+        <p14:creationId xmlns:p14="http://schemas.microsoft.com/office/powerpoint/2010/main" val="2879369088"/>
+      </p:ext>
+    </p:extLst>
+  </p:cSld>
+  <p:clrMapOvr>
+    <a:masterClrMapping/>
+  </p:clrMapOvr>
+</p:notes>
+</file>
+
+<file path=ppt/notesSlides/notesSlide2.xml><?xml version="1.0" encoding="utf-8"?>
+<p:notes xmlns:a="http://schemas.openxmlformats.org/drawingml/2006/main" xmlns:r="http://schemas.openxmlformats.org/officeDocument/2006/relationships" xmlns:p="http://schemas.openxmlformats.org/presentationml/2006/main">
+  <p:cSld>
+    <p:spTree>
+      <p:nvGrpSpPr>
+        <p:cNvPr id="1" name=""/>
+        <p:cNvGrpSpPr/>
+        <p:nvPr/>
+      </p:nvGrpSpPr>
+      <p:grpSpPr>
+        <a:xfrm>
+          <a:off x="0" y="0"/>
+          <a:ext cx="0" cy="0"/>
+          <a:chOff x="0" y="0"/>
+          <a:chExt cx="0" cy="0"/>
+        </a:xfrm>
+      </p:grpSpPr>
+      <p:sp>
+        <p:nvSpPr>
+          <p:cNvPr id="2" name="Slide Image Placeholder 1"/>
+          <p:cNvSpPr>
+            <a:spLocks noGrp="1" noRot="1" noChangeAspect="1"/>
+          </p:cNvSpPr>
+          <p:nvPr>
+            <p:ph type="sldImg"/>
+          </p:nvPr>
+        </p:nvSpPr>
+        <p:spPr/>
+      </p:sp>
+      <p:sp>
+        <p:nvSpPr>
+          <p:cNvPr id="3" name="Notes Placeholder 2"/>
+          <p:cNvSpPr>
+            <a:spLocks noGrp="1"/>
+          </p:cNvSpPr>
+          <p:nvPr>
+            <p:ph type="body" idx="1"/>
+          </p:nvPr>
+        </p:nvSpPr>
+        <p:spPr/>
+        <p:txBody>
+          <a:bodyPr/>
+          <a:lstStyle/>
+          <a:p>
+            <a:r>
+              <a:rPr lang="en-US" dirty="0"/>
+              <a:t>Describe curtains and how we need dual-spacecraft to identify them.  The two lines are from AC6-A and AC6–B.</a:t>
+            </a:r>
+          </a:p>
+          <a:p>
+            <a:endParaRPr lang="en-US" dirty="0"/>
+          </a:p>
+          <a:p>
+            <a:r>
+              <a:rPr lang="en-US" dirty="0"/>
+              <a:t>Bottom panel is the in-track-lag adjusted time series that shows significant fine structure that persists for at least seconds to minutes. This almost unchanging structure is what gets me exited and wondering on what magnetospheric process creates them.</a:t>
+            </a:r>
+          </a:p>
+          <a:p>
+            <a:endParaRPr lang="en-US" dirty="0"/>
+          </a:p>
+          <a:p>
+            <a:r>
+              <a:rPr lang="en-US" dirty="0"/>
+              <a:t>We need two spacecraft as a sanity check: the top panel shows no correlation and confirms that these curtains are stationary.</a:t>
+            </a:r>
+          </a:p>
+        </p:txBody>
+      </p:sp>
+      <p:sp>
+        <p:nvSpPr>
+          <p:cNvPr id="4" name="Slide Number Placeholder 3"/>
+          <p:cNvSpPr>
+            <a:spLocks noGrp="1"/>
+          </p:cNvSpPr>
+          <p:nvPr>
+            <p:ph type="sldNum" sz="quarter" idx="5"/>
+          </p:nvPr>
+        </p:nvSpPr>
+        <p:spPr/>
+        <p:txBody>
+          <a:bodyPr/>
+          <a:lstStyle/>
+          <a:p>
+            <a:fld id="{80735E49-1439-6B48-B6E8-4CB903FA9C2D}" type="slidenum">
+              <a:rPr lang="en-US" smtClean="0"/>
+              <a:t>2</a:t>
+            </a:fld>
+            <a:endParaRPr lang="en-US"/>
+          </a:p>
+        </p:txBody>
+      </p:sp>
+    </p:spTree>
+    <p:extLst>
+      <p:ext uri="{BB962C8B-B14F-4D97-AF65-F5344CB8AC3E}">
+        <p14:creationId xmlns:p14="http://schemas.microsoft.com/office/powerpoint/2010/main" val="967556432"/>
+      </p:ext>
+    </p:extLst>
+  </p:cSld>
+  <p:clrMapOvr>
+    <a:masterClrMapping/>
+  </p:clrMapOvr>
+</p:notes>
+</file>
+
+<file path=ppt/notesSlides/notesSlide3.xml><?xml version="1.0" encoding="utf-8"?>
+<p:notes xmlns:a="http://schemas.openxmlformats.org/drawingml/2006/main" xmlns:r="http://schemas.openxmlformats.org/officeDocument/2006/relationships" xmlns:p="http://schemas.openxmlformats.org/presentationml/2006/main">
+  <p:cSld>
+    <p:spTree>
+      <p:nvGrpSpPr>
+        <p:cNvPr id="1" name=""/>
+        <p:cNvGrpSpPr/>
+        <p:nvPr/>
+      </p:nvGrpSpPr>
+      <p:grpSpPr>
+        <a:xfrm>
+          <a:off x="0" y="0"/>
+          <a:ext cx="0" cy="0"/>
+          <a:chOff x="0" y="0"/>
+          <a:chExt cx="0" cy="0"/>
+        </a:xfrm>
+      </p:grpSpPr>
+      <p:sp>
+        <p:nvSpPr>
+          <p:cNvPr id="2" name="Slide Image Placeholder 1"/>
+          <p:cNvSpPr>
+            <a:spLocks noGrp="1" noRot="1" noChangeAspect="1"/>
+          </p:cNvSpPr>
+          <p:nvPr>
+            <p:ph type="sldImg"/>
+          </p:nvPr>
+        </p:nvSpPr>
+        <p:spPr/>
+      </p:sp>
+      <p:sp>
+        <p:nvSpPr>
+          <p:cNvPr id="3" name="Notes Placeholder 2"/>
+          <p:cNvSpPr>
+            <a:spLocks noGrp="1"/>
+          </p:cNvSpPr>
+          <p:nvPr>
+            <p:ph type="body" idx="1"/>
+          </p:nvPr>
+        </p:nvSpPr>
+        <p:spPr/>
+        <p:txBody>
+          <a:bodyPr/>
+          <a:lstStyle/>
+          <a:p>
+            <a:r>
+              <a:rPr lang="en-US" dirty="0"/>
+              <a:t>Curtains were observed in the BLC. This is due to the weaker magnetic field strength in the SAA, conjugate to here.</a:t>
+            </a:r>
+          </a:p>
+          <a:p>
+            <a:endParaRPr lang="en-US" dirty="0"/>
+          </a:p>
+          <a:p>
+            <a:r>
+              <a:rPr lang="en-US" dirty="0"/>
+              <a:t>This region is unique and important to particle precipitation scientists who use LEO satellites. Any electrons observed here can either precipitate below AC6, or locally mirror and precipitate in the SAA. </a:t>
+            </a:r>
+          </a:p>
+          <a:p>
+            <a:endParaRPr lang="en-US" dirty="0"/>
+          </a:p>
+          <a:p>
+            <a:r>
+              <a:rPr lang="en-US" dirty="0"/>
+              <a:t>In other words, prolonged precipitation observed here is due to actively precipitating, and not drifting particles.</a:t>
+            </a:r>
+          </a:p>
+        </p:txBody>
+      </p:sp>
+      <p:sp>
+        <p:nvSpPr>
+          <p:cNvPr id="4" name="Slide Number Placeholder 3"/>
+          <p:cNvSpPr>
+            <a:spLocks noGrp="1"/>
+          </p:cNvSpPr>
+          <p:nvPr>
+            <p:ph type="sldNum" sz="quarter" idx="5"/>
+          </p:nvPr>
+        </p:nvSpPr>
+        <p:spPr/>
+        <p:txBody>
+          <a:bodyPr/>
+          <a:lstStyle/>
+          <a:p>
+            <a:fld id="{80735E49-1439-6B48-B6E8-4CB903FA9C2D}" type="slidenum">
+              <a:rPr lang="en-US" smtClean="0"/>
+              <a:t>7</a:t>
+            </a:fld>
+            <a:endParaRPr lang="en-US"/>
+          </a:p>
+        </p:txBody>
+      </p:sp>
+    </p:spTree>
+    <p:extLst>
+      <p:ext uri="{BB962C8B-B14F-4D97-AF65-F5344CB8AC3E}">
+        <p14:creationId xmlns:p14="http://schemas.microsoft.com/office/powerpoint/2010/main" val="2960026099"/>
+      </p:ext>
+    </p:extLst>
+  </p:cSld>
+  <p:clrMapOvr>
+    <a:masterClrMapping/>
+  </p:clrMapOvr>
+</p:notes>
+</file>
+
+<file path=ppt/notesSlides/notesSlide4.xml><?xml version="1.0" encoding="utf-8"?>
+<p:notes xmlns:a="http://schemas.openxmlformats.org/drawingml/2006/main" xmlns:r="http://schemas.openxmlformats.org/officeDocument/2006/relationships" xmlns:p="http://schemas.openxmlformats.org/presentationml/2006/main">
+  <p:cSld>
+    <p:spTree>
+      <p:nvGrpSpPr>
+        <p:cNvPr id="1" name=""/>
+        <p:cNvGrpSpPr/>
+        <p:nvPr/>
+      </p:nvGrpSpPr>
+      <p:grpSpPr>
+        <a:xfrm>
+          <a:off x="0" y="0"/>
+          <a:ext cx="0" cy="0"/>
+          <a:chOff x="0" y="0"/>
+          <a:chExt cx="0" cy="0"/>
+        </a:xfrm>
+      </p:grpSpPr>
+      <p:sp>
+        <p:nvSpPr>
+          <p:cNvPr id="2" name="Slide Image Placeholder 1"/>
+          <p:cNvSpPr>
+            <a:spLocks noGrp="1" noRot="1" noChangeAspect="1"/>
+          </p:cNvSpPr>
+          <p:nvPr>
+            <p:ph type="sldImg"/>
+          </p:nvPr>
+        </p:nvSpPr>
+        <p:spPr/>
+      </p:sp>
+      <p:sp>
+        <p:nvSpPr>
+          <p:cNvPr id="3" name="Notes Placeholder 2"/>
+          <p:cNvSpPr>
+            <a:spLocks noGrp="1"/>
+          </p:cNvSpPr>
+          <p:nvPr>
+            <p:ph type="body" idx="1"/>
+          </p:nvPr>
+        </p:nvSpPr>
+        <p:spPr/>
+        <p:txBody>
+          <a:bodyPr/>
+          <a:lstStyle/>
+          <a:p>
+            <a:r>
+              <a:rPr lang="en-US" dirty="0"/>
+              <a:t>Used a model of the magnetic field to calculate the conjugate altitude of locally mirroring electrons. </a:t>
+            </a:r>
+          </a:p>
+          <a:p>
+            <a:endParaRPr lang="en-US" dirty="0"/>
+          </a:p>
+          <a:p>
+            <a:r>
+              <a:rPr lang="en-US" dirty="0"/>
+              <a:t>This line is the line at which electrons will mirror below 100 km in the SAA. Electrons are likely lost.</a:t>
+            </a:r>
+          </a:p>
+        </p:txBody>
+      </p:sp>
+      <p:sp>
+        <p:nvSpPr>
+          <p:cNvPr id="4" name="Slide Number Placeholder 3"/>
+          <p:cNvSpPr>
+            <a:spLocks noGrp="1"/>
+          </p:cNvSpPr>
+          <p:nvPr>
+            <p:ph type="sldNum" sz="quarter" idx="5"/>
+          </p:nvPr>
+        </p:nvSpPr>
+        <p:spPr/>
+        <p:txBody>
+          <a:bodyPr/>
+          <a:lstStyle/>
+          <a:p>
+            <a:fld id="{80735E49-1439-6B48-B6E8-4CB903FA9C2D}" type="slidenum">
+              <a:rPr lang="en-US" smtClean="0"/>
+              <a:t>8</a:t>
+            </a:fld>
+            <a:endParaRPr lang="en-US"/>
+          </a:p>
+        </p:txBody>
+      </p:sp>
+    </p:spTree>
+    <p:extLst>
+      <p:ext uri="{BB962C8B-B14F-4D97-AF65-F5344CB8AC3E}">
+        <p14:creationId xmlns:p14="http://schemas.microsoft.com/office/powerpoint/2010/main" val="779471301"/>
+      </p:ext>
+    </p:extLst>
+  </p:cSld>
+  <p:clrMapOvr>
+    <a:masterClrMapping/>
+  </p:clrMapOvr>
+</p:notes>
+</file>
+
+<file path=ppt/notesSlides/notesSlide5.xml><?xml version="1.0" encoding="utf-8"?>
+<p:notes xmlns:a="http://schemas.openxmlformats.org/drawingml/2006/main" xmlns:r="http://schemas.openxmlformats.org/officeDocument/2006/relationships" xmlns:p="http://schemas.openxmlformats.org/presentationml/2006/main">
+  <p:cSld>
+    <p:spTree>
+      <p:nvGrpSpPr>
+        <p:cNvPr id="1" name=""/>
+        <p:cNvGrpSpPr/>
+        <p:nvPr/>
+      </p:nvGrpSpPr>
+      <p:grpSpPr>
+        <a:xfrm>
+          <a:off x="0" y="0"/>
+          <a:ext cx="0" cy="0"/>
+          <a:chOff x="0" y="0"/>
+          <a:chExt cx="0" cy="0"/>
+        </a:xfrm>
+      </p:grpSpPr>
+      <p:sp>
+        <p:nvSpPr>
+          <p:cNvPr id="2" name="Slide Image Placeholder 1"/>
+          <p:cNvSpPr>
+            <a:spLocks noGrp="1" noRot="1" noChangeAspect="1"/>
+          </p:cNvSpPr>
+          <p:nvPr>
+            <p:ph type="sldImg"/>
+          </p:nvPr>
+        </p:nvSpPr>
+        <p:spPr/>
+      </p:sp>
+      <p:sp>
+        <p:nvSpPr>
+          <p:cNvPr id="3" name="Notes Placeholder 2"/>
+          <p:cNvSpPr>
+            <a:spLocks noGrp="1"/>
+          </p:cNvSpPr>
+          <p:nvPr>
+            <p:ph type="body" idx="1"/>
+          </p:nvPr>
+        </p:nvSpPr>
+        <p:spPr/>
+        <p:txBody>
+          <a:bodyPr/>
+          <a:lstStyle/>
+          <a:p>
+            <a:pPr marL="0" marR="0" lvl="0" indent="0" algn="l" defTabSz="914400" rtl="0" eaLnBrk="1" fontAlgn="auto" latinLnBrk="0" hangingPunct="1">
+              <a:lnSpc>
+                <a:spcPct val="100000"/>
+              </a:lnSpc>
+              <a:spcBef>
+                <a:spcPts val="0"/>
+              </a:spcBef>
+              <a:spcAft>
+                <a:spcPts val="0"/>
+              </a:spcAft>
+              <a:buClrTx/>
+              <a:buSzTx/>
+              <a:buFontTx/>
+              <a:buNone/>
+              <a:tabLst/>
+              <a:defRPr/>
+            </a:pPr>
+            <a:r>
+              <a:rPr lang="en-US" dirty="0"/>
+              <a:t>This line is the line at which electrons will mirror below sea level in the SAA. Electrons are definitely lost.</a:t>
+            </a:r>
+          </a:p>
+          <a:p>
+            <a:pPr marL="0" marR="0" lvl="0" indent="0" algn="l" defTabSz="914400" rtl="0" eaLnBrk="1" fontAlgn="auto" latinLnBrk="0" hangingPunct="1">
+              <a:lnSpc>
+                <a:spcPct val="100000"/>
+              </a:lnSpc>
+              <a:spcBef>
+                <a:spcPts val="0"/>
+              </a:spcBef>
+              <a:spcAft>
+                <a:spcPts val="0"/>
+              </a:spcAft>
+              <a:buClrTx/>
+              <a:buSzTx/>
+              <a:buFontTx/>
+              <a:buNone/>
+              <a:tabLst/>
+              <a:defRPr/>
+            </a:pPr>
+            <a:endParaRPr lang="en-US" dirty="0"/>
+          </a:p>
+          <a:p>
+            <a:pPr marL="0" marR="0" lvl="0" indent="0" algn="l" defTabSz="914400" rtl="0" eaLnBrk="1" fontAlgn="auto" latinLnBrk="0" hangingPunct="1">
+              <a:lnSpc>
+                <a:spcPct val="100000"/>
+              </a:lnSpc>
+              <a:spcBef>
+                <a:spcPts val="0"/>
+              </a:spcBef>
+              <a:spcAft>
+                <a:spcPts val="0"/>
+              </a:spcAft>
+              <a:buClrTx/>
+              <a:buSzTx/>
+              <a:buFontTx/>
+              <a:buNone/>
+              <a:tabLst/>
+              <a:defRPr/>
+            </a:pPr>
+            <a:r>
+              <a:rPr lang="en-US" dirty="0"/>
+              <a:t>What can cause continuous acceleration of electrons into the atmosphere? Our current alternative hypothesis is a DC parallel electric field. If true, there will be signatures of aurora on the ground.</a:t>
+            </a:r>
+          </a:p>
+          <a:p>
+            <a:endParaRPr lang="en-US" dirty="0"/>
+          </a:p>
+        </p:txBody>
+      </p:sp>
+      <p:sp>
+        <p:nvSpPr>
+          <p:cNvPr id="4" name="Slide Number Placeholder 3"/>
+          <p:cNvSpPr>
+            <a:spLocks noGrp="1"/>
+          </p:cNvSpPr>
+          <p:nvPr>
+            <p:ph type="sldNum" sz="quarter" idx="5"/>
+          </p:nvPr>
+        </p:nvSpPr>
+        <p:spPr/>
+        <p:txBody>
+          <a:bodyPr/>
+          <a:lstStyle/>
+          <a:p>
+            <a:fld id="{80735E49-1439-6B48-B6E8-4CB903FA9C2D}" type="slidenum">
+              <a:rPr lang="en-US" smtClean="0"/>
+              <a:t>9</a:t>
+            </a:fld>
+            <a:endParaRPr lang="en-US"/>
+          </a:p>
+        </p:txBody>
+      </p:sp>
+    </p:spTree>
+    <p:extLst>
+      <p:ext uri="{BB962C8B-B14F-4D97-AF65-F5344CB8AC3E}">
+        <p14:creationId xmlns:p14="http://schemas.microsoft.com/office/powerpoint/2010/main" val="3775134847"/>
+      </p:ext>
+    </p:extLst>
+  </p:cSld>
+  <p:clrMapOvr>
+    <a:masterClrMapping/>
+  </p:clrMapOvr>
+</p:notes>
 </file>
 
 <file path=ppt/slideLayouts/slideLayout1.xml><?xml version="1.0" encoding="utf-8"?>
@@ -3733,7 +4312,7 @@
           <p:nvPr/>
         </p:nvPicPr>
         <p:blipFill rotWithShape="1">
-          <a:blip r:embed="rId2"/>
+          <a:blip r:embed="rId3"/>
           <a:srcRect t="46816" r="71926"/>
           <a:stretch/>
         </p:blipFill>
@@ -3816,7 +4395,7 @@
             </a:r>
             <a:r>
               <a:rPr lang="en-US" dirty="0"/>
-              <a:t> </a:t>
+              <a:t> (Mike) </a:t>
             </a:r>
             <a:r>
               <a:rPr lang="en-US" dirty="0" err="1"/>
@@ -3943,7 +4522,7 @@
           <p:nvPr/>
         </p:nvPicPr>
         <p:blipFill>
-          <a:blip r:embed="rId3"/>
+          <a:blip r:embed="rId4"/>
           <a:stretch>
             <a:fillRect/>
           </a:stretch>
@@ -3971,6 +4550,195 @@
 </p:sld>
 </file>
 
+<file path=ppt/slides/slide10.xml><?xml version="1.0" encoding="utf-8"?>
+<p:sld xmlns:a="http://schemas.openxmlformats.org/drawingml/2006/main" xmlns:r="http://schemas.openxmlformats.org/officeDocument/2006/relationships" xmlns:p="http://schemas.openxmlformats.org/presentationml/2006/main">
+  <p:cSld>
+    <p:spTree>
+      <p:nvGrpSpPr>
+        <p:cNvPr id="1" name=""/>
+        <p:cNvGrpSpPr/>
+        <p:nvPr/>
+      </p:nvGrpSpPr>
+      <p:grpSpPr>
+        <a:xfrm>
+          <a:off x="0" y="0"/>
+          <a:ext cx="0" cy="0"/>
+          <a:chOff x="0" y="0"/>
+          <a:chExt cx="0" cy="0"/>
+        </a:xfrm>
+      </p:grpSpPr>
+      <p:sp>
+        <p:nvSpPr>
+          <p:cNvPr id="4" name="Date Placeholder 3">
+            <a:extLst>
+              <a:ext uri="{FF2B5EF4-FFF2-40B4-BE49-F238E27FC236}">
+                <a16:creationId xmlns:a16="http://schemas.microsoft.com/office/drawing/2014/main" id="{5EE385B0-A710-2342-8F9A-3489895AE86F}"/>
+              </a:ext>
+            </a:extLst>
+          </p:cNvPr>
+          <p:cNvSpPr>
+            <a:spLocks noGrp="1"/>
+          </p:cNvSpPr>
+          <p:nvPr>
+            <p:ph type="dt" sz="half" idx="10"/>
+          </p:nvPr>
+        </p:nvSpPr>
+        <p:spPr/>
+        <p:txBody>
+          <a:bodyPr/>
+          <a:lstStyle/>
+          <a:p>
+            <a:fld id="{6A15CBF3-736A-FD45-AE47-88A67B03EDF7}" type="datetime1">
+              <a:rPr lang="en-US" smtClean="0"/>
+              <a:t>11/5/20</a:t>
+            </a:fld>
+            <a:endParaRPr lang="en-US" dirty="0"/>
+          </a:p>
+        </p:txBody>
+      </p:sp>
+      <p:sp>
+        <p:nvSpPr>
+          <p:cNvPr id="5" name="Footer Placeholder 4">
+            <a:extLst>
+              <a:ext uri="{FF2B5EF4-FFF2-40B4-BE49-F238E27FC236}">
+                <a16:creationId xmlns:a16="http://schemas.microsoft.com/office/drawing/2014/main" id="{240EE550-9A7F-7647-961D-9D4DFCB790F9}"/>
+              </a:ext>
+            </a:extLst>
+          </p:cNvPr>
+          <p:cNvSpPr>
+            <a:spLocks noGrp="1"/>
+          </p:cNvSpPr>
+          <p:nvPr>
+            <p:ph type="ftr" sz="quarter" idx="11"/>
+          </p:nvPr>
+        </p:nvSpPr>
+        <p:spPr/>
+        <p:txBody>
+          <a:bodyPr/>
+          <a:lstStyle/>
+          <a:p>
+            <a:r>
+              <a:rPr lang="en-US"/>
+              <a:t>Mykhaylo Shumko | SM023-08</a:t>
+            </a:r>
+          </a:p>
+        </p:txBody>
+      </p:sp>
+      <p:sp>
+        <p:nvSpPr>
+          <p:cNvPr id="6" name="Slide Number Placeholder 5">
+            <a:extLst>
+              <a:ext uri="{FF2B5EF4-FFF2-40B4-BE49-F238E27FC236}">
+                <a16:creationId xmlns:a16="http://schemas.microsoft.com/office/drawing/2014/main" id="{3E4CA15E-0634-2146-A849-19DDBC2687D3}"/>
+              </a:ext>
+            </a:extLst>
+          </p:cNvPr>
+          <p:cNvSpPr>
+            <a:spLocks noGrp="1"/>
+          </p:cNvSpPr>
+          <p:nvPr>
+            <p:ph type="sldNum" sz="quarter" idx="12"/>
+          </p:nvPr>
+        </p:nvSpPr>
+        <p:spPr/>
+        <p:txBody>
+          <a:bodyPr/>
+          <a:lstStyle/>
+          <a:p>
+            <a:fld id="{81496180-7CCD-9949-9FC6-636262BC9A7B}" type="slidenum">
+              <a:rPr lang="en-US" smtClean="0"/>
+              <a:t>10</a:t>
+            </a:fld>
+            <a:endParaRPr lang="en-US"/>
+          </a:p>
+        </p:txBody>
+      </p:sp>
+      <p:pic>
+        <p:nvPicPr>
+          <p:cNvPr id="7" name="Content Placeholder 7">
+            <a:extLst>
+              <a:ext uri="{FF2B5EF4-FFF2-40B4-BE49-F238E27FC236}">
+                <a16:creationId xmlns:a16="http://schemas.microsoft.com/office/drawing/2014/main" id="{24CD1FA6-3955-6642-AD26-8ADAF0491E6D}"/>
+              </a:ext>
+            </a:extLst>
+          </p:cNvPr>
+          <p:cNvPicPr>
+            <a:picLocks noGrp="1" noChangeAspect="1"/>
+          </p:cNvPicPr>
+          <p:nvPr>
+            <p:ph idx="1"/>
+          </p:nvPr>
+        </p:nvPicPr>
+        <p:blipFill>
+          <a:blip r:embed="rId2"/>
+          <a:stretch>
+            <a:fillRect/>
+          </a:stretch>
+        </p:blipFill>
+        <p:spPr>
+          <a:xfrm>
+            <a:off x="4009099" y="166021"/>
+            <a:ext cx="7836321" cy="6094917"/>
+          </a:xfrm>
+        </p:spPr>
+      </p:pic>
+      <p:sp>
+        <p:nvSpPr>
+          <p:cNvPr id="8" name="TextBox 7">
+            <a:extLst>
+              <a:ext uri="{FF2B5EF4-FFF2-40B4-BE49-F238E27FC236}">
+                <a16:creationId xmlns:a16="http://schemas.microsoft.com/office/drawing/2014/main" id="{8F7A4DE7-4F1B-274C-B595-D7E7EBC9C782}"/>
+              </a:ext>
+            </a:extLst>
+          </p:cNvPr>
+          <p:cNvSpPr txBox="1"/>
+          <p:nvPr/>
+        </p:nvSpPr>
+        <p:spPr>
+          <a:xfrm>
+            <a:off x="346580" y="240804"/>
+            <a:ext cx="3910519" cy="5816977"/>
+          </a:xfrm>
+          <a:prstGeom prst="rect">
+            <a:avLst/>
+          </a:prstGeom>
+          <a:noFill/>
+        </p:spPr>
+        <p:txBody>
+          <a:bodyPr wrap="square" rtlCol="0">
+            <a:spAutoFit/>
+          </a:bodyPr>
+          <a:lstStyle/>
+          <a:p>
+            <a:r>
+              <a:rPr lang="en-US" sz="3600" b="1" dirty="0"/>
+              <a:t>Questions?</a:t>
+            </a:r>
+          </a:p>
+          <a:p>
+            <a:endParaRPr lang="en-US" sz="3600" b="1" dirty="0"/>
+          </a:p>
+          <a:p>
+            <a:r>
+              <a:rPr lang="en-US" sz="3000" dirty="0"/>
+              <a:t>Curtains are a stationary and narrow in latitude. Some could be drifting but we found evidence that others are continuously precipitating. Maybe curtains are the higher energy tail of the aurora?</a:t>
+            </a:r>
+          </a:p>
+        </p:txBody>
+      </p:sp>
+    </p:spTree>
+    <p:extLst>
+      <p:ext uri="{BB962C8B-B14F-4D97-AF65-F5344CB8AC3E}">
+        <p14:creationId xmlns:p14="http://schemas.microsoft.com/office/powerpoint/2010/main" val="3098839761"/>
+      </p:ext>
+    </p:extLst>
+  </p:cSld>
+  <p:clrMapOvr>
+    <a:masterClrMapping/>
+  </p:clrMapOvr>
+</p:sld>
+</file>
+
 <file path=ppt/slides/slide2.xml><?xml version="1.0" encoding="utf-8"?>
 <p:sld xmlns:a="http://schemas.openxmlformats.org/drawingml/2006/main" xmlns:r="http://schemas.openxmlformats.org/officeDocument/2006/relationships" xmlns:p="http://schemas.openxmlformats.org/presentationml/2006/main">
   <p:cSld>
@@ -4013,7 +4781,7 @@
           <a:p>
             <a:r>
               <a:rPr lang="en-US" sz="3200" dirty="0"/>
-              <a:t>Curtains are a latitudinally narrow and persistent &gt; 30 keV electron precipitation into the atmosphere. Can be differentiated from microbursts using multiple spacecraft. </a:t>
+              <a:t>Curtains are latitudinally narrow and persistent &gt; 30 keV electron precipitation into the atmosphere. Distinguished from microbursts using multiple spacecraft.</a:t>
             </a:r>
           </a:p>
         </p:txBody>
@@ -4035,7 +4803,7 @@
           </p:nvPr>
         </p:nvPicPr>
         <p:blipFill>
-          <a:blip r:embed="rId2"/>
+          <a:blip r:embed="rId3"/>
           <a:stretch>
             <a:fillRect/>
           </a:stretch>
@@ -4070,7 +4838,7 @@
           <a:p>
             <a:fld id="{6A15CBF3-736A-FD45-AE47-88A67B03EDF7}" type="datetime1">
               <a:rPr lang="en-US" smtClean="0"/>
-              <a:t>11/3/20</a:t>
+              <a:t>11/5/20</a:t>
             </a:fld>
             <a:endParaRPr lang="en-US"/>
           </a:p>
@@ -4130,6 +4898,522 @@
               <a:t>2</a:t>
             </a:fld>
             <a:endParaRPr lang="en-US"/>
+          </a:p>
+        </p:txBody>
+      </p:sp>
+      <p:sp>
+        <p:nvSpPr>
+          <p:cNvPr id="9" name="Rectangle 8">
+            <a:extLst>
+              <a:ext uri="{FF2B5EF4-FFF2-40B4-BE49-F238E27FC236}">
+                <a16:creationId xmlns:a16="http://schemas.microsoft.com/office/drawing/2014/main" id="{C039D119-B097-284A-9F92-386D6CC0DC45}"/>
+              </a:ext>
+            </a:extLst>
+          </p:cNvPr>
+          <p:cNvSpPr/>
+          <p:nvPr/>
+        </p:nvSpPr>
+        <p:spPr>
+          <a:xfrm>
+            <a:off x="838200" y="3878826"/>
+            <a:ext cx="10515600" cy="2046053"/>
+          </a:xfrm>
+          <a:prstGeom prst="rect">
+            <a:avLst/>
+          </a:prstGeom>
+          <a:noFill/>
+          <a:ln w="38100">
+            <a:solidFill>
+              <a:srgbClr val="FF0000"/>
+            </a:solidFill>
+            <a:extLst>
+              <a:ext uri="{C807C97D-BFC1-408E-A445-0C87EB9F89A2}">
+                <ask:lineSketchStyleProps xmlns:ask="http://schemas.microsoft.com/office/drawing/2018/sketchyshapes" sd="1219033472">
+                  <a:custGeom>
+                    <a:avLst/>
+                    <a:gdLst>
+                      <a:gd name="connsiteX0" fmla="*/ 0 w 10675374"/>
+                      <a:gd name="connsiteY0" fmla="*/ 0 h 2389239"/>
+                      <a:gd name="connsiteX1" fmla="*/ 560457 w 10675374"/>
+                      <a:gd name="connsiteY1" fmla="*/ 0 h 2389239"/>
+                      <a:gd name="connsiteX2" fmla="*/ 907407 w 10675374"/>
+                      <a:gd name="connsiteY2" fmla="*/ 0 h 2389239"/>
+                      <a:gd name="connsiteX3" fmla="*/ 1788125 w 10675374"/>
+                      <a:gd name="connsiteY3" fmla="*/ 0 h 2389239"/>
+                      <a:gd name="connsiteX4" fmla="*/ 2348582 w 10675374"/>
+                      <a:gd name="connsiteY4" fmla="*/ 0 h 2389239"/>
+                      <a:gd name="connsiteX5" fmla="*/ 2909039 w 10675374"/>
+                      <a:gd name="connsiteY5" fmla="*/ 0 h 2389239"/>
+                      <a:gd name="connsiteX6" fmla="*/ 3789758 w 10675374"/>
+                      <a:gd name="connsiteY6" fmla="*/ 0 h 2389239"/>
+                      <a:gd name="connsiteX7" fmla="*/ 4243461 w 10675374"/>
+                      <a:gd name="connsiteY7" fmla="*/ 0 h 2389239"/>
+                      <a:gd name="connsiteX8" fmla="*/ 5124180 w 10675374"/>
+                      <a:gd name="connsiteY8" fmla="*/ 0 h 2389239"/>
+                      <a:gd name="connsiteX9" fmla="*/ 6004898 w 10675374"/>
+                      <a:gd name="connsiteY9" fmla="*/ 0 h 2389239"/>
+                      <a:gd name="connsiteX10" fmla="*/ 6672109 w 10675374"/>
+                      <a:gd name="connsiteY10" fmla="*/ 0 h 2389239"/>
+                      <a:gd name="connsiteX11" fmla="*/ 7552827 w 10675374"/>
+                      <a:gd name="connsiteY11" fmla="*/ 0 h 2389239"/>
+                      <a:gd name="connsiteX12" fmla="*/ 8113284 w 10675374"/>
+                      <a:gd name="connsiteY12" fmla="*/ 0 h 2389239"/>
+                      <a:gd name="connsiteX13" fmla="*/ 8673741 w 10675374"/>
+                      <a:gd name="connsiteY13" fmla="*/ 0 h 2389239"/>
+                      <a:gd name="connsiteX14" fmla="*/ 9447706 w 10675374"/>
+                      <a:gd name="connsiteY14" fmla="*/ 0 h 2389239"/>
+                      <a:gd name="connsiteX15" fmla="*/ 10008163 w 10675374"/>
+                      <a:gd name="connsiteY15" fmla="*/ 0 h 2389239"/>
+                      <a:gd name="connsiteX16" fmla="*/ 10675374 w 10675374"/>
+                      <a:gd name="connsiteY16" fmla="*/ 0 h 2389239"/>
+                      <a:gd name="connsiteX17" fmla="*/ 10675374 w 10675374"/>
+                      <a:gd name="connsiteY17" fmla="*/ 645095 h 2389239"/>
+                      <a:gd name="connsiteX18" fmla="*/ 10675374 w 10675374"/>
+                      <a:gd name="connsiteY18" fmla="*/ 1266297 h 2389239"/>
+                      <a:gd name="connsiteX19" fmla="*/ 10675374 w 10675374"/>
+                      <a:gd name="connsiteY19" fmla="*/ 2389239 h 2389239"/>
+                      <a:gd name="connsiteX20" fmla="*/ 10328424 w 10675374"/>
+                      <a:gd name="connsiteY20" fmla="*/ 2389239 h 2389239"/>
+                      <a:gd name="connsiteX21" fmla="*/ 9447706 w 10675374"/>
+                      <a:gd name="connsiteY21" fmla="*/ 2389239 h 2389239"/>
+                      <a:gd name="connsiteX22" fmla="*/ 8780495 w 10675374"/>
+                      <a:gd name="connsiteY22" fmla="*/ 2389239 h 2389239"/>
+                      <a:gd name="connsiteX23" fmla="*/ 8326792 w 10675374"/>
+                      <a:gd name="connsiteY23" fmla="*/ 2389239 h 2389239"/>
+                      <a:gd name="connsiteX24" fmla="*/ 7659581 w 10675374"/>
+                      <a:gd name="connsiteY24" fmla="*/ 2389239 h 2389239"/>
+                      <a:gd name="connsiteX25" fmla="*/ 7312631 w 10675374"/>
+                      <a:gd name="connsiteY25" fmla="*/ 2389239 h 2389239"/>
+                      <a:gd name="connsiteX26" fmla="*/ 6965682 w 10675374"/>
+                      <a:gd name="connsiteY26" fmla="*/ 2389239 h 2389239"/>
+                      <a:gd name="connsiteX27" fmla="*/ 6298471 w 10675374"/>
+                      <a:gd name="connsiteY27" fmla="*/ 2389239 h 2389239"/>
+                      <a:gd name="connsiteX28" fmla="*/ 5844767 w 10675374"/>
+                      <a:gd name="connsiteY28" fmla="*/ 2389239 h 2389239"/>
+                      <a:gd name="connsiteX29" fmla="*/ 5070803 w 10675374"/>
+                      <a:gd name="connsiteY29" fmla="*/ 2389239 h 2389239"/>
+                      <a:gd name="connsiteX30" fmla="*/ 4617099 w 10675374"/>
+                      <a:gd name="connsiteY30" fmla="*/ 2389239 h 2389239"/>
+                      <a:gd name="connsiteX31" fmla="*/ 3843135 w 10675374"/>
+                      <a:gd name="connsiteY31" fmla="*/ 2389239 h 2389239"/>
+                      <a:gd name="connsiteX32" fmla="*/ 3496185 w 10675374"/>
+                      <a:gd name="connsiteY32" fmla="*/ 2389239 h 2389239"/>
+                      <a:gd name="connsiteX33" fmla="*/ 2722220 w 10675374"/>
+                      <a:gd name="connsiteY33" fmla="*/ 2389239 h 2389239"/>
+                      <a:gd name="connsiteX34" fmla="*/ 2268517 w 10675374"/>
+                      <a:gd name="connsiteY34" fmla="*/ 2389239 h 2389239"/>
+                      <a:gd name="connsiteX35" fmla="*/ 1921567 w 10675374"/>
+                      <a:gd name="connsiteY35" fmla="*/ 2389239 h 2389239"/>
+                      <a:gd name="connsiteX36" fmla="*/ 1467864 w 10675374"/>
+                      <a:gd name="connsiteY36" fmla="*/ 2389239 h 2389239"/>
+                      <a:gd name="connsiteX37" fmla="*/ 693899 w 10675374"/>
+                      <a:gd name="connsiteY37" fmla="*/ 2389239 h 2389239"/>
+                      <a:gd name="connsiteX38" fmla="*/ 0 w 10675374"/>
+                      <a:gd name="connsiteY38" fmla="*/ 2389239 h 2389239"/>
+                      <a:gd name="connsiteX39" fmla="*/ 0 w 10675374"/>
+                      <a:gd name="connsiteY39" fmla="*/ 1863606 h 2389239"/>
+                      <a:gd name="connsiteX40" fmla="*/ 0 w 10675374"/>
+                      <a:gd name="connsiteY40" fmla="*/ 1337974 h 2389239"/>
+                      <a:gd name="connsiteX41" fmla="*/ 0 w 10675374"/>
+                      <a:gd name="connsiteY41" fmla="*/ 716772 h 2389239"/>
+                      <a:gd name="connsiteX42" fmla="*/ 0 w 10675374"/>
+                      <a:gd name="connsiteY42" fmla="*/ 0 h 2389239"/>
+                    </a:gdLst>
+                    <a:ahLst/>
+                    <a:cxnLst>
+                      <a:cxn ang="0">
+                        <a:pos x="connsiteX0" y="connsiteY0"/>
+                      </a:cxn>
+                      <a:cxn ang="0">
+                        <a:pos x="connsiteX1" y="connsiteY1"/>
+                      </a:cxn>
+                      <a:cxn ang="0">
+                        <a:pos x="connsiteX2" y="connsiteY2"/>
+                      </a:cxn>
+                      <a:cxn ang="0">
+                        <a:pos x="connsiteX3" y="connsiteY3"/>
+                      </a:cxn>
+                      <a:cxn ang="0">
+                        <a:pos x="connsiteX4" y="connsiteY4"/>
+                      </a:cxn>
+                      <a:cxn ang="0">
+                        <a:pos x="connsiteX5" y="connsiteY5"/>
+                      </a:cxn>
+                      <a:cxn ang="0">
+                        <a:pos x="connsiteX6" y="connsiteY6"/>
+                      </a:cxn>
+                      <a:cxn ang="0">
+                        <a:pos x="connsiteX7" y="connsiteY7"/>
+                      </a:cxn>
+                      <a:cxn ang="0">
+                        <a:pos x="connsiteX8" y="connsiteY8"/>
+                      </a:cxn>
+                      <a:cxn ang="0">
+                        <a:pos x="connsiteX9" y="connsiteY9"/>
+                      </a:cxn>
+                      <a:cxn ang="0">
+                        <a:pos x="connsiteX10" y="connsiteY10"/>
+                      </a:cxn>
+                      <a:cxn ang="0">
+                        <a:pos x="connsiteX11" y="connsiteY11"/>
+                      </a:cxn>
+                      <a:cxn ang="0">
+                        <a:pos x="connsiteX12" y="connsiteY12"/>
+                      </a:cxn>
+                      <a:cxn ang="0">
+                        <a:pos x="connsiteX13" y="connsiteY13"/>
+                      </a:cxn>
+                      <a:cxn ang="0">
+                        <a:pos x="connsiteX14" y="connsiteY14"/>
+                      </a:cxn>
+                      <a:cxn ang="0">
+                        <a:pos x="connsiteX15" y="connsiteY15"/>
+                      </a:cxn>
+                      <a:cxn ang="0">
+                        <a:pos x="connsiteX16" y="connsiteY16"/>
+                      </a:cxn>
+                      <a:cxn ang="0">
+                        <a:pos x="connsiteX17" y="connsiteY17"/>
+                      </a:cxn>
+                      <a:cxn ang="0">
+                        <a:pos x="connsiteX18" y="connsiteY18"/>
+                      </a:cxn>
+                      <a:cxn ang="0">
+                        <a:pos x="connsiteX19" y="connsiteY19"/>
+                      </a:cxn>
+                      <a:cxn ang="0">
+                        <a:pos x="connsiteX20" y="connsiteY20"/>
+                      </a:cxn>
+                      <a:cxn ang="0">
+                        <a:pos x="connsiteX21" y="connsiteY21"/>
+                      </a:cxn>
+                      <a:cxn ang="0">
+                        <a:pos x="connsiteX22" y="connsiteY22"/>
+                      </a:cxn>
+                      <a:cxn ang="0">
+                        <a:pos x="connsiteX23" y="connsiteY23"/>
+                      </a:cxn>
+                      <a:cxn ang="0">
+                        <a:pos x="connsiteX24" y="connsiteY24"/>
+                      </a:cxn>
+                      <a:cxn ang="0">
+                        <a:pos x="connsiteX25" y="connsiteY25"/>
+                      </a:cxn>
+                      <a:cxn ang="0">
+                        <a:pos x="connsiteX26" y="connsiteY26"/>
+                      </a:cxn>
+                      <a:cxn ang="0">
+                        <a:pos x="connsiteX27" y="connsiteY27"/>
+                      </a:cxn>
+                      <a:cxn ang="0">
+                        <a:pos x="connsiteX28" y="connsiteY28"/>
+                      </a:cxn>
+                      <a:cxn ang="0">
+                        <a:pos x="connsiteX29" y="connsiteY29"/>
+                      </a:cxn>
+                      <a:cxn ang="0">
+                        <a:pos x="connsiteX30" y="connsiteY30"/>
+                      </a:cxn>
+                      <a:cxn ang="0">
+                        <a:pos x="connsiteX31" y="connsiteY31"/>
+                      </a:cxn>
+                      <a:cxn ang="0">
+                        <a:pos x="connsiteX32" y="connsiteY32"/>
+                      </a:cxn>
+                      <a:cxn ang="0">
+                        <a:pos x="connsiteX33" y="connsiteY33"/>
+                      </a:cxn>
+                      <a:cxn ang="0">
+                        <a:pos x="connsiteX34" y="connsiteY34"/>
+                      </a:cxn>
+                      <a:cxn ang="0">
+                        <a:pos x="connsiteX35" y="connsiteY35"/>
+                      </a:cxn>
+                      <a:cxn ang="0">
+                        <a:pos x="connsiteX36" y="connsiteY36"/>
+                      </a:cxn>
+                      <a:cxn ang="0">
+                        <a:pos x="connsiteX37" y="connsiteY37"/>
+                      </a:cxn>
+                      <a:cxn ang="0">
+                        <a:pos x="connsiteX38" y="connsiteY38"/>
+                      </a:cxn>
+                      <a:cxn ang="0">
+                        <a:pos x="connsiteX39" y="connsiteY39"/>
+                      </a:cxn>
+                      <a:cxn ang="0">
+                        <a:pos x="connsiteX40" y="connsiteY40"/>
+                      </a:cxn>
+                      <a:cxn ang="0">
+                        <a:pos x="connsiteX41" y="connsiteY41"/>
+                      </a:cxn>
+                      <a:cxn ang="0">
+                        <a:pos x="connsiteX42" y="connsiteY42"/>
+                      </a:cxn>
+                    </a:cxnLst>
+                    <a:rect l="l" t="t" r="r" b="b"/>
+                    <a:pathLst>
+                      <a:path w="10675374" h="2389239" extrusionOk="0">
+                        <a:moveTo>
+                          <a:pt x="0" y="0"/>
+                        </a:moveTo>
+                        <a:cubicBezTo>
+                          <a:pt x="276034" y="19324"/>
+                          <a:pt x="297028" y="22941"/>
+                          <a:pt x="560457" y="0"/>
+                        </a:cubicBezTo>
+                        <a:cubicBezTo>
+                          <a:pt x="823886" y="-22941"/>
+                          <a:pt x="744803" y="-5499"/>
+                          <a:pt x="907407" y="0"/>
+                        </a:cubicBezTo>
+                        <a:cubicBezTo>
+                          <a:pt x="1070011" y="5499"/>
+                          <a:pt x="1457561" y="12710"/>
+                          <a:pt x="1788125" y="0"/>
+                        </a:cubicBezTo>
+                        <a:cubicBezTo>
+                          <a:pt x="2118689" y="-12710"/>
+                          <a:pt x="2188257" y="13107"/>
+                          <a:pt x="2348582" y="0"/>
+                        </a:cubicBezTo>
+                        <a:cubicBezTo>
+                          <a:pt x="2508907" y="-13107"/>
+                          <a:pt x="2735511" y="12000"/>
+                          <a:pt x="2909039" y="0"/>
+                        </a:cubicBezTo>
+                        <a:cubicBezTo>
+                          <a:pt x="3082567" y="-12000"/>
+                          <a:pt x="3554236" y="1199"/>
+                          <a:pt x="3789758" y="0"/>
+                        </a:cubicBezTo>
+                        <a:cubicBezTo>
+                          <a:pt x="4025280" y="-1199"/>
+                          <a:pt x="4152538" y="-18384"/>
+                          <a:pt x="4243461" y="0"/>
+                        </a:cubicBezTo>
+                        <a:cubicBezTo>
+                          <a:pt x="4334384" y="18384"/>
+                          <a:pt x="4806849" y="-20219"/>
+                          <a:pt x="5124180" y="0"/>
+                        </a:cubicBezTo>
+                        <a:cubicBezTo>
+                          <a:pt x="5441511" y="20219"/>
+                          <a:pt x="5576628" y="-21009"/>
+                          <a:pt x="6004898" y="0"/>
+                        </a:cubicBezTo>
+                        <a:cubicBezTo>
+                          <a:pt x="6433168" y="21009"/>
+                          <a:pt x="6349275" y="9596"/>
+                          <a:pt x="6672109" y="0"/>
+                        </a:cubicBezTo>
+                        <a:cubicBezTo>
+                          <a:pt x="6994943" y="-9596"/>
+                          <a:pt x="7296863" y="-34800"/>
+                          <a:pt x="7552827" y="0"/>
+                        </a:cubicBezTo>
+                        <a:cubicBezTo>
+                          <a:pt x="7808791" y="34800"/>
+                          <a:pt x="7859554" y="1326"/>
+                          <a:pt x="8113284" y="0"/>
+                        </a:cubicBezTo>
+                        <a:cubicBezTo>
+                          <a:pt x="8367014" y="-1326"/>
+                          <a:pt x="8502891" y="-11528"/>
+                          <a:pt x="8673741" y="0"/>
+                        </a:cubicBezTo>
+                        <a:cubicBezTo>
+                          <a:pt x="8844591" y="11528"/>
+                          <a:pt x="9191243" y="-21623"/>
+                          <a:pt x="9447706" y="0"/>
+                        </a:cubicBezTo>
+                        <a:cubicBezTo>
+                          <a:pt x="9704170" y="21623"/>
+                          <a:pt x="9829327" y="-10617"/>
+                          <a:pt x="10008163" y="0"/>
+                        </a:cubicBezTo>
+                        <a:cubicBezTo>
+                          <a:pt x="10186999" y="10617"/>
+                          <a:pt x="10513033" y="-8599"/>
+                          <a:pt x="10675374" y="0"/>
+                        </a:cubicBezTo>
+                        <a:cubicBezTo>
+                          <a:pt x="10681582" y="303728"/>
+                          <a:pt x="10703838" y="402634"/>
+                          <a:pt x="10675374" y="645095"/>
+                        </a:cubicBezTo>
+                        <a:cubicBezTo>
+                          <a:pt x="10646910" y="887557"/>
+                          <a:pt x="10683676" y="1049427"/>
+                          <a:pt x="10675374" y="1266297"/>
+                        </a:cubicBezTo>
+                        <a:cubicBezTo>
+                          <a:pt x="10667072" y="1483167"/>
+                          <a:pt x="10685906" y="2040474"/>
+                          <a:pt x="10675374" y="2389239"/>
+                        </a:cubicBezTo>
+                        <a:cubicBezTo>
+                          <a:pt x="10583457" y="2380354"/>
+                          <a:pt x="10423808" y="2379934"/>
+                          <a:pt x="10328424" y="2389239"/>
+                        </a:cubicBezTo>
+                        <a:cubicBezTo>
+                          <a:pt x="10233040" y="2398545"/>
+                          <a:pt x="9640495" y="2417951"/>
+                          <a:pt x="9447706" y="2389239"/>
+                        </a:cubicBezTo>
+                        <a:cubicBezTo>
+                          <a:pt x="9254917" y="2360527"/>
+                          <a:pt x="8928445" y="2382527"/>
+                          <a:pt x="8780495" y="2389239"/>
+                        </a:cubicBezTo>
+                        <a:cubicBezTo>
+                          <a:pt x="8632545" y="2395951"/>
+                          <a:pt x="8530273" y="2367333"/>
+                          <a:pt x="8326792" y="2389239"/>
+                        </a:cubicBezTo>
+                        <a:cubicBezTo>
+                          <a:pt x="8123311" y="2411145"/>
+                          <a:pt x="7940387" y="2399542"/>
+                          <a:pt x="7659581" y="2389239"/>
+                        </a:cubicBezTo>
+                        <a:cubicBezTo>
+                          <a:pt x="7378775" y="2378936"/>
+                          <a:pt x="7444251" y="2372183"/>
+                          <a:pt x="7312631" y="2389239"/>
+                        </a:cubicBezTo>
+                        <a:cubicBezTo>
+                          <a:pt x="7181011" y="2406296"/>
+                          <a:pt x="7068653" y="2401669"/>
+                          <a:pt x="6965682" y="2389239"/>
+                        </a:cubicBezTo>
+                        <a:cubicBezTo>
+                          <a:pt x="6862711" y="2376809"/>
+                          <a:pt x="6589629" y="2360720"/>
+                          <a:pt x="6298471" y="2389239"/>
+                        </a:cubicBezTo>
+                        <a:cubicBezTo>
+                          <a:pt x="6007313" y="2417758"/>
+                          <a:pt x="6031821" y="2390162"/>
+                          <a:pt x="5844767" y="2389239"/>
+                        </a:cubicBezTo>
+                        <a:cubicBezTo>
+                          <a:pt x="5657713" y="2388316"/>
+                          <a:pt x="5263525" y="2410553"/>
+                          <a:pt x="5070803" y="2389239"/>
+                        </a:cubicBezTo>
+                        <a:cubicBezTo>
+                          <a:pt x="4878081" y="2367925"/>
+                          <a:pt x="4765881" y="2405168"/>
+                          <a:pt x="4617099" y="2389239"/>
+                        </a:cubicBezTo>
+                        <a:cubicBezTo>
+                          <a:pt x="4468317" y="2373310"/>
+                          <a:pt x="4016451" y="2395476"/>
+                          <a:pt x="3843135" y="2389239"/>
+                        </a:cubicBezTo>
+                        <a:cubicBezTo>
+                          <a:pt x="3669819" y="2383002"/>
+                          <a:pt x="3569209" y="2390434"/>
+                          <a:pt x="3496185" y="2389239"/>
+                        </a:cubicBezTo>
+                        <a:cubicBezTo>
+                          <a:pt x="3423161" y="2388045"/>
+                          <a:pt x="2985968" y="2360393"/>
+                          <a:pt x="2722220" y="2389239"/>
+                        </a:cubicBezTo>
+                        <a:cubicBezTo>
+                          <a:pt x="2458472" y="2418085"/>
+                          <a:pt x="2432264" y="2384837"/>
+                          <a:pt x="2268517" y="2389239"/>
+                        </a:cubicBezTo>
+                        <a:cubicBezTo>
+                          <a:pt x="2104770" y="2393641"/>
+                          <a:pt x="2060565" y="2380092"/>
+                          <a:pt x="1921567" y="2389239"/>
+                        </a:cubicBezTo>
+                        <a:cubicBezTo>
+                          <a:pt x="1782569" y="2398387"/>
+                          <a:pt x="1559575" y="2382654"/>
+                          <a:pt x="1467864" y="2389239"/>
+                        </a:cubicBezTo>
+                        <a:cubicBezTo>
+                          <a:pt x="1376153" y="2395824"/>
+                          <a:pt x="1072880" y="2407357"/>
+                          <a:pt x="693899" y="2389239"/>
+                        </a:cubicBezTo>
+                        <a:cubicBezTo>
+                          <a:pt x="314918" y="2371121"/>
+                          <a:pt x="271049" y="2417363"/>
+                          <a:pt x="0" y="2389239"/>
+                        </a:cubicBezTo>
+                        <a:cubicBezTo>
+                          <a:pt x="5710" y="2128994"/>
+                          <a:pt x="16395" y="2082178"/>
+                          <a:pt x="0" y="1863606"/>
+                        </a:cubicBezTo>
+                        <a:cubicBezTo>
+                          <a:pt x="-16395" y="1645034"/>
+                          <a:pt x="-25686" y="1589449"/>
+                          <a:pt x="0" y="1337974"/>
+                        </a:cubicBezTo>
+                        <a:cubicBezTo>
+                          <a:pt x="25686" y="1086499"/>
+                          <a:pt x="-26384" y="1016727"/>
+                          <a:pt x="0" y="716772"/>
+                        </a:cubicBezTo>
+                        <a:cubicBezTo>
+                          <a:pt x="26384" y="416817"/>
+                          <a:pt x="13675" y="235688"/>
+                          <a:pt x="0" y="0"/>
+                        </a:cubicBezTo>
+                        <a:close/>
+                      </a:path>
+                    </a:pathLst>
+                  </a:custGeom>
+                  <ask:type>
+                    <ask:lineSketchNone/>
+                  </ask:type>
+                </ask:lineSketchStyleProps>
+              </a:ext>
+            </a:extLst>
+          </a:ln>
+        </p:spPr>
+        <p:style>
+          <a:lnRef idx="2">
+            <a:schemeClr val="accent1">
+              <a:shade val="50000"/>
+            </a:schemeClr>
+          </a:lnRef>
+          <a:fillRef idx="1">
+            <a:schemeClr val="accent1"/>
+          </a:fillRef>
+          <a:effectRef idx="0">
+            <a:schemeClr val="accent1"/>
+          </a:effectRef>
+          <a:fontRef idx="minor">
+            <a:schemeClr val="lt1"/>
+          </a:fontRef>
+        </p:style>
+        <p:txBody>
+          <a:bodyPr rtlCol="0" anchor="ctr"/>
+          <a:lstStyle/>
+          <a:p>
+            <a:pPr algn="ctr"/>
+            <a:endParaRPr lang="en-US" b="1">
+              <a:ln w="22225">
+                <a:solidFill>
+                  <a:schemeClr val="accent2"/>
+                </a:solidFill>
+                <a:prstDash val="solid"/>
+              </a:ln>
+              <a:solidFill>
+                <a:schemeClr val="accent2">
+                  <a:lumMod val="40000"/>
+                  <a:lumOff val="60000"/>
+                </a:schemeClr>
+              </a:solidFill>
+            </a:endParaRPr>
           </a:p>
         </p:txBody>
       </p:sp>
@@ -4217,7 +5501,7 @@
               <a:rPr lang="en-US" smtClean="0"/>
               <a:t>11/3/20</a:t>
             </a:fld>
-            <a:endParaRPr lang="en-US"/>
+            <a:endParaRPr lang="en-US" dirty="0"/>
           </a:p>
         </p:txBody>
       </p:sp>
@@ -4293,7 +5577,7 @@
         <p:spPr>
           <a:xfrm>
             <a:off x="427703" y="545690"/>
-            <a:ext cx="4020780" cy="3416320"/>
+            <a:ext cx="4020780" cy="5078313"/>
           </a:xfrm>
           <a:prstGeom prst="rect">
             <a:avLst/>
@@ -4308,7 +5592,13 @@
           <a:p>
             <a:r>
               <a:rPr lang="en-US" sz="3600" dirty="0"/>
-              <a:t>Curtains are narrow: many are about 10 kilometers wide in latitude, and 90% are less than 20 kilometers wide.</a:t>
+              <a:t>Used the orbital velocity to convert from curtain duration to width.</a:t>
+            </a:r>
+          </a:p>
+          <a:p>
+            <a:r>
+              <a:rPr lang="en-US" sz="3600" dirty="0"/>
+              <a:t>Many curtains are about 10 kilometers wide in latitude, and 90% are less than 20 kilometers wide.</a:t>
             </a:r>
           </a:p>
         </p:txBody>
@@ -4327,7 +5617,7 @@
 </file>
 
 <file path=ppt/slides/slide4.xml><?xml version="1.0" encoding="utf-8"?>
-<p:sld xmlns:a="http://schemas.openxmlformats.org/drawingml/2006/main" xmlns:r="http://schemas.openxmlformats.org/officeDocument/2006/relationships" xmlns:p="http://schemas.openxmlformats.org/presentationml/2006/main">
+<p:sld xmlns:a="http://schemas.openxmlformats.org/drawingml/2006/main" xmlns:r="http://schemas.openxmlformats.org/officeDocument/2006/relationships" xmlns:p="http://schemas.openxmlformats.org/presentationml/2006/main" show="0">
   <p:cSld>
     <p:spTree>
       <p:nvGrpSpPr>
@@ -4543,7 +5833,10 @@
           <a:bodyPr/>
           <a:lstStyle/>
           <a:p>
-            <a:endParaRPr lang="en-US" dirty="0"/>
+            <a:r>
+              <a:rPr lang="en-US" dirty="0"/>
+              <a:t>Curtains are observed at high L, and most often pre-midnight MLT.</a:t>
+            </a:r>
           </a:p>
         </p:txBody>
       </p:sp>
@@ -4571,8 +5864,8 @@
         </p:blipFill>
         <p:spPr>
           <a:xfrm>
-            <a:off x="838200" y="2123508"/>
-            <a:ext cx="10515600" cy="3755571"/>
+            <a:off x="31080" y="1828800"/>
+            <a:ext cx="12147902" cy="4338536"/>
           </a:xfrm>
         </p:spPr>
       </p:pic>
@@ -4882,7 +6175,7 @@
           </p:nvPr>
         </p:nvPicPr>
         <p:blipFill>
-          <a:blip r:embed="rId2"/>
+          <a:blip r:embed="rId3"/>
           <a:stretch>
             <a:fillRect/>
           </a:stretch>
@@ -4917,7 +6210,7 @@
           <a:p>
             <a:fld id="{6A15CBF3-736A-FD45-AE47-88A67B03EDF7}" type="datetime1">
               <a:rPr lang="en-US" smtClean="0"/>
-              <a:t>11/3/20</a:t>
+              <a:t>11/5/20</a:t>
             </a:fld>
             <a:endParaRPr lang="en-US"/>
           </a:p>
@@ -4995,7 +6288,7 @@
         <p:spPr>
           <a:xfrm>
             <a:off x="339213" y="604684"/>
-            <a:ext cx="3242187" cy="3785652"/>
+            <a:ext cx="3242187" cy="2677656"/>
           </a:xfrm>
           <a:prstGeom prst="rect">
             <a:avLst/>
@@ -5007,15 +6300,6 @@
             <a:spAutoFit/>
           </a:bodyPr>
           <a:lstStyle/>
-          <a:p>
-            <a:r>
-              <a:rPr lang="en-US" sz="2400" dirty="0"/>
-              <a:t>AC6 has no pitch angle resolution. </a:t>
-            </a:r>
-          </a:p>
-          <a:p>
-            <a:endParaRPr lang="en-US" sz="2400" dirty="0"/>
-          </a:p>
           <a:p>
             <a:r>
               <a:rPr lang="en-US" sz="2400" dirty="0"/>
@@ -5071,7 +6355,7 @@
           </p:nvPr>
         </p:nvPicPr>
         <p:blipFill>
-          <a:blip r:embed="rId2"/>
+          <a:blip r:embed="rId3"/>
           <a:stretch>
             <a:fillRect/>
           </a:stretch>
@@ -5106,7 +6390,7 @@
           <a:p>
             <a:fld id="{6A15CBF3-736A-FD45-AE47-88A67B03EDF7}" type="datetime1">
               <a:rPr lang="en-US" smtClean="0"/>
-              <a:t>11/3/20</a:t>
+              <a:t>11/5/20</a:t>
             </a:fld>
             <a:endParaRPr lang="en-US"/>
           </a:p>
@@ -5184,7 +6468,7 @@
         <p:spPr>
           <a:xfrm>
             <a:off x="339213" y="604684"/>
-            <a:ext cx="3242187" cy="3785652"/>
+            <a:ext cx="3242187" cy="2677656"/>
           </a:xfrm>
           <a:prstGeom prst="rect">
             <a:avLst/>
@@ -5196,15 +6480,6 @@
             <a:spAutoFit/>
           </a:bodyPr>
           <a:lstStyle/>
-          <a:p>
-            <a:r>
-              <a:rPr lang="en-US" sz="2400" dirty="0"/>
-              <a:t>AC6 has no pitch angle resolution. </a:t>
-            </a:r>
-          </a:p>
-          <a:p>
-            <a:endParaRPr lang="en-US" sz="2400" dirty="0"/>
-          </a:p>
           <a:p>
             <a:r>
               <a:rPr lang="en-US" sz="2400" dirty="0"/>
@@ -5302,7 +6577,7 @@
           </p:nvPr>
         </p:nvPicPr>
         <p:blipFill>
-          <a:blip r:embed="rId2"/>
+          <a:blip r:embed="rId3"/>
           <a:stretch>
             <a:fillRect/>
           </a:stretch>
@@ -5337,7 +6612,7 @@
           <a:p>
             <a:fld id="{6A15CBF3-736A-FD45-AE47-88A67B03EDF7}" type="datetime1">
               <a:rPr lang="en-US" smtClean="0"/>
-              <a:t>11/3/20</a:t>
+              <a:t>11/5/20</a:t>
             </a:fld>
             <a:endParaRPr lang="en-US"/>
           </a:p>
@@ -5415,7 +6690,7 @@
         <p:spPr>
           <a:xfrm>
             <a:off x="339213" y="604684"/>
-            <a:ext cx="3242187" cy="3785652"/>
+            <a:ext cx="3242187" cy="2677656"/>
           </a:xfrm>
           <a:prstGeom prst="rect">
             <a:avLst/>
@@ -5427,15 +6702,6 @@
             <a:spAutoFit/>
           </a:bodyPr>
           <a:lstStyle/>
-          <a:p>
-            <a:r>
-              <a:rPr lang="en-US" sz="2400" dirty="0"/>
-              <a:t>AC6 has no pitch angle resolution. </a:t>
-            </a:r>
-          </a:p>
-          <a:p>
-            <a:endParaRPr lang="en-US" sz="2400" dirty="0"/>
-          </a:p>
           <a:p>
             <a:r>
               <a:rPr lang="en-US" sz="2400" dirty="0"/>

</xml_diff>

<commit_message>
Updated the slides: Moved the slide visuals to the
</commit_message>
<xml_diff>
--- a/reports/2020_shumko_agu_slides.pptx
+++ b/reports/2020_shumko_agu_slides.pptx
@@ -15,8 +15,8 @@
     <p:sldId id="260" r:id="rId6"/>
     <p:sldId id="261" r:id="rId7"/>
     <p:sldId id="262" r:id="rId8"/>
-    <p:sldId id="263" r:id="rId9"/>
-    <p:sldId id="264" r:id="rId10"/>
+    <p:sldId id="266" r:id="rId9"/>
+    <p:sldId id="267" r:id="rId10"/>
     <p:sldId id="265" r:id="rId11"/>
   </p:sldIdLst>
   <p:sldSz cx="12192000" cy="6858000"/>
@@ -116,6 +116,11 @@
       </a:defRPr>
     </a:lvl9pPr>
   </p:defaultTextStyle>
+  <p:extLst>
+    <p:ext uri="{EFAFB233-063F-42B5-8137-9DF3F51BA10A}">
+      <p15:sldGuideLst xmlns:p15="http://schemas.microsoft.com/office/powerpoint/2012/main"/>
+    </p:ext>
+  </p:extLst>
 </p:presentation>
 </file>
 
@@ -201,7 +206,7 @@
           <a:p>
             <a:fld id="{8E334586-B0AA-C34A-8719-5F8F6906651C}" type="datetimeFigureOut">
               <a:rPr lang="en-US" smtClean="0"/>
-              <a:t>11/3/20</a:t>
+              <a:t>11/10/2020</a:t>
             </a:fld>
             <a:endParaRPr lang="en-US"/>
           </a:p>
@@ -846,7 +851,7 @@
           <a:p>
             <a:r>
               <a:rPr lang="en-US" dirty="0"/>
-              <a:t>Used a model of the magnetic field to calculate the conjugate altitude of locally mirroring electrons. </a:t>
+              <a:t>Curtains were observed in the BLC. This is due to the weaker magnetic field strength in the SAA, conjugate to here.</a:t>
             </a:r>
           </a:p>
           <a:p>
@@ -855,7 +860,16 @@
           <a:p>
             <a:r>
               <a:rPr lang="en-US" dirty="0"/>
-              <a:t>This line is the line at which electrons will mirror below 100 km in the SAA. Electrons are likely lost.</a:t>
+              <a:t>This region is unique and important to particle precipitation scientists who use LEO satellites. Any electrons observed here can either precipitate below AC6, or locally mirror and precipitate in the SAA. </a:t>
+            </a:r>
+          </a:p>
+          <a:p>
+            <a:endParaRPr lang="en-US" dirty="0"/>
+          </a:p>
+          <a:p>
+            <a:r>
+              <a:rPr lang="en-US" dirty="0"/>
+              <a:t>In other words, prolonged precipitation observed here is due to actively precipitating, and not drifting particles.</a:t>
             </a:r>
           </a:p>
         </p:txBody>
@@ -886,7 +900,7 @@
     </p:spTree>
     <p:extLst>
       <p:ext uri="{BB962C8B-B14F-4D97-AF65-F5344CB8AC3E}">
-        <p14:creationId xmlns:p14="http://schemas.microsoft.com/office/powerpoint/2010/main" val="779471301"/>
+        <p14:creationId xmlns:p14="http://schemas.microsoft.com/office/powerpoint/2010/main" val="3562052513"/>
       </p:ext>
     </p:extLst>
   </p:cSld>
@@ -940,73 +954,28 @@
           <a:bodyPr/>
           <a:lstStyle/>
           <a:p>
-            <a:pPr marL="0" marR="0" lvl="0" indent="0" algn="l" defTabSz="914400" rtl="0" eaLnBrk="1" fontAlgn="auto" latinLnBrk="0" hangingPunct="1">
-              <a:lnSpc>
-                <a:spcPct val="100000"/>
-              </a:lnSpc>
-              <a:spcBef>
-                <a:spcPts val="0"/>
-              </a:spcBef>
-              <a:spcAft>
-                <a:spcPts val="0"/>
-              </a:spcAft>
-              <a:buClrTx/>
-              <a:buSzTx/>
-              <a:buFontTx/>
-              <a:buNone/>
-              <a:tabLst/>
-              <a:defRPr/>
-            </a:pPr>
             <a:r>
               <a:rPr lang="en-US" dirty="0"/>
-              <a:t>This line is the line at which electrons will mirror below sea level in the SAA. Electrons are definitely lost.</a:t>
-            </a:r>
-          </a:p>
-          <a:p>
-            <a:pPr marL="0" marR="0" lvl="0" indent="0" algn="l" defTabSz="914400" rtl="0" eaLnBrk="1" fontAlgn="auto" latinLnBrk="0" hangingPunct="1">
-              <a:lnSpc>
-                <a:spcPct val="100000"/>
-              </a:lnSpc>
-              <a:spcBef>
-                <a:spcPts val="0"/>
-              </a:spcBef>
-              <a:spcAft>
-                <a:spcPts val="0"/>
-              </a:spcAft>
-              <a:buClrTx/>
-              <a:buSzTx/>
-              <a:buFontTx/>
-              <a:buNone/>
-              <a:tabLst/>
-              <a:defRPr/>
-            </a:pPr>
+              <a:t>Curtains were observed in the BLC. This is due to the weaker magnetic field strength in the SAA, conjugate to here.</a:t>
+            </a:r>
+          </a:p>
+          <a:p>
             <a:endParaRPr lang="en-US" dirty="0"/>
           </a:p>
           <a:p>
-            <a:pPr marL="0" marR="0" lvl="0" indent="0" algn="l" defTabSz="914400" rtl="0" eaLnBrk="1" fontAlgn="auto" latinLnBrk="0" hangingPunct="1">
-              <a:lnSpc>
-                <a:spcPct val="100000"/>
-              </a:lnSpc>
-              <a:spcBef>
-                <a:spcPts val="0"/>
-              </a:spcBef>
-              <a:spcAft>
-                <a:spcPts val="0"/>
-              </a:spcAft>
-              <a:buClrTx/>
-              <a:buSzTx/>
-              <a:buFontTx/>
-              <a:buNone/>
-              <a:tabLst/>
-              <a:defRPr/>
-            </a:pPr>
             <a:r>
               <a:rPr lang="en-US" dirty="0"/>
-              <a:t>What can cause continuous acceleration of electrons into the atmosphere? Our current alternative hypothesis is a DC parallel electric field. If true, there will be signatures of aurora on the ground.</a:t>
+              <a:t>This region is unique and important to particle precipitation scientists who use LEO satellites. Any electrons observed here can either precipitate below AC6, or locally mirror and precipitate in the SAA. </a:t>
             </a:r>
           </a:p>
           <a:p>
             <a:endParaRPr lang="en-US" dirty="0"/>
+          </a:p>
+          <a:p>
+            <a:r>
+              <a:rPr lang="en-US" dirty="0"/>
+              <a:t>In other words, prolonged precipitation observed here is due to actively precipitating, and not drifting particles.</a:t>
+            </a:r>
           </a:p>
         </p:txBody>
       </p:sp>
@@ -1036,7 +1005,7 @@
     </p:spTree>
     <p:extLst>
       <p:ext uri="{BB962C8B-B14F-4D97-AF65-F5344CB8AC3E}">
-        <p14:creationId xmlns:p14="http://schemas.microsoft.com/office/powerpoint/2010/main" val="3775134847"/>
+        <p14:creationId xmlns:p14="http://schemas.microsoft.com/office/powerpoint/2010/main" val="3578728018"/>
       </p:ext>
     </p:extLst>
   </p:cSld>
@@ -1193,7 +1162,7 @@
           <a:p>
             <a:fld id="{1080490E-7718-BC44-BC69-C257EBB5CC24}" type="datetime1">
               <a:rPr lang="en-US" smtClean="0"/>
-              <a:t>11/3/20</a:t>
+              <a:t>11/10/2020</a:t>
             </a:fld>
             <a:endParaRPr lang="en-US"/>
           </a:p>
@@ -1394,7 +1363,7 @@
           <a:p>
             <a:fld id="{49186892-258B-604E-81F7-F992D5EB22FF}" type="datetime1">
               <a:rPr lang="en-US" smtClean="0"/>
-              <a:t>11/3/20</a:t>
+              <a:t>11/10/2020</a:t>
             </a:fld>
             <a:endParaRPr lang="en-US"/>
           </a:p>
@@ -1605,7 +1574,7 @@
           <a:p>
             <a:fld id="{644194C2-2926-1C42-8CB2-21221B97285F}" type="datetime1">
               <a:rPr lang="en-US" smtClean="0"/>
-              <a:t>11/3/20</a:t>
+              <a:t>11/10/2020</a:t>
             </a:fld>
             <a:endParaRPr lang="en-US"/>
           </a:p>
@@ -1806,7 +1775,7 @@
           <a:p>
             <a:fld id="{6A15CBF3-736A-FD45-AE47-88A67B03EDF7}" type="datetime1">
               <a:rPr lang="en-US" smtClean="0"/>
-              <a:t>11/3/20</a:t>
+              <a:t>11/10/2020</a:t>
             </a:fld>
             <a:endParaRPr lang="en-US"/>
           </a:p>
@@ -2084,7 +2053,7 @@
           <a:p>
             <a:fld id="{76336078-6C0E-4945-97DE-61160BE69E15}" type="datetime1">
               <a:rPr lang="en-US" smtClean="0"/>
-              <a:t>11/3/20</a:t>
+              <a:t>11/10/2020</a:t>
             </a:fld>
             <a:endParaRPr lang="en-US"/>
           </a:p>
@@ -2352,7 +2321,7 @@
           <a:p>
             <a:fld id="{3EDF247E-B7A7-744D-ACDF-83E05DAC55C3}" type="datetime1">
               <a:rPr lang="en-US" smtClean="0"/>
-              <a:t>11/3/20</a:t>
+              <a:t>11/10/2020</a:t>
             </a:fld>
             <a:endParaRPr lang="en-US"/>
           </a:p>
@@ -2767,7 +2736,7 @@
           <a:p>
             <a:fld id="{E6C2ABAC-E601-444D-B546-664997A7FEA4}" type="datetime1">
               <a:rPr lang="en-US" smtClean="0"/>
-              <a:t>11/3/20</a:t>
+              <a:t>11/10/2020</a:t>
             </a:fld>
             <a:endParaRPr lang="en-US"/>
           </a:p>
@@ -2911,7 +2880,7 @@
           <a:p>
             <a:fld id="{A615EC2C-A8DF-6841-9623-594E702BE919}" type="datetime1">
               <a:rPr lang="en-US" smtClean="0"/>
-              <a:t>11/3/20</a:t>
+              <a:t>11/10/2020</a:t>
             </a:fld>
             <a:endParaRPr lang="en-US"/>
           </a:p>
@@ -3027,7 +2996,7 @@
           <a:p>
             <a:fld id="{B38A9BE6-B1E0-8841-8AD1-F571A10B56C1}" type="datetime1">
               <a:rPr lang="en-US" smtClean="0"/>
-              <a:t>11/3/20</a:t>
+              <a:t>11/10/2020</a:t>
             </a:fld>
             <a:endParaRPr lang="en-US"/>
           </a:p>
@@ -3341,7 +3310,7 @@
           <a:p>
             <a:fld id="{424C4740-5D69-C34A-96EF-7E0C31A51CC1}" type="datetime1">
               <a:rPr lang="en-US" smtClean="0"/>
-              <a:t>11/3/20</a:t>
+              <a:t>11/10/2020</a:t>
             </a:fld>
             <a:endParaRPr lang="en-US"/>
           </a:p>
@@ -3632,7 +3601,7 @@
           <a:p>
             <a:fld id="{AE484DD1-6012-924B-BC31-936A7C6992E8}" type="datetime1">
               <a:rPr lang="en-US" smtClean="0"/>
-              <a:t>11/3/20</a:t>
+              <a:t>11/10/2020</a:t>
             </a:fld>
             <a:endParaRPr lang="en-US"/>
           </a:p>
@@ -3876,7 +3845,7 @@
           <a:p>
             <a:fld id="{AB3E70C3-C1C5-D046-AB4B-4D3B3DE00E86}" type="datetime1">
               <a:rPr lang="en-US" smtClean="0"/>
-              <a:t>11/3/20</a:t>
+              <a:t>11/10/2020</a:t>
             </a:fld>
             <a:endParaRPr lang="en-US"/>
           </a:p>
@@ -4318,8 +4287,8 @@
         </p:blipFill>
         <p:spPr>
           <a:xfrm>
-            <a:off x="7281706" y="3288547"/>
-            <a:ext cx="4453094" cy="3086331"/>
+            <a:off x="7403690" y="273651"/>
+            <a:ext cx="3608901" cy="2501241"/>
           </a:xfrm>
           <a:prstGeom prst="rect">
             <a:avLst/>
@@ -4444,7 +4413,7 @@
           <a:p>
             <a:fld id="{1D309A4F-0522-884B-99C5-17A07BC65268}" type="datetime1">
               <a:rPr lang="en-US" smtClean="0"/>
-              <a:t>11/3/20</a:t>
+              <a:t>11/10/2020</a:t>
             </a:fld>
             <a:endParaRPr lang="en-US"/>
           </a:p>
@@ -4529,8 +4498,8 @@
         </p:blipFill>
         <p:spPr>
           <a:xfrm>
-            <a:off x="7153887" y="173668"/>
-            <a:ext cx="4750403" cy="3038048"/>
+            <a:off x="7283217" y="2774892"/>
+            <a:ext cx="3849848" cy="2462112"/>
           </a:xfrm>
           <a:prstGeom prst="rect">
             <a:avLst/>
@@ -4590,7 +4559,7 @@
           <a:p>
             <a:fld id="{6A15CBF3-736A-FD45-AE47-88A67B03EDF7}" type="datetime1">
               <a:rPr lang="en-US" smtClean="0"/>
-              <a:t>11/5/20</a:t>
+              <a:t>11/10/2020</a:t>
             </a:fld>
             <a:endParaRPr lang="en-US" dirty="0"/>
           </a:p>
@@ -4677,8 +4646,8 @@
         </p:blipFill>
         <p:spPr>
           <a:xfrm>
-            <a:off x="4009099" y="166021"/>
-            <a:ext cx="7836321" cy="6094917"/>
+            <a:off x="0" y="231495"/>
+            <a:ext cx="7398746" cy="5754578"/>
           </a:xfrm>
         </p:spPr>
       </p:pic>
@@ -4696,8 +4665,8 @@
         </p:nvSpPr>
         <p:spPr>
           <a:xfrm>
-            <a:off x="346580" y="240804"/>
-            <a:ext cx="3910519" cy="5816977"/>
+            <a:off x="7364696" y="221092"/>
+            <a:ext cx="4827304" cy="4647426"/>
           </a:xfrm>
           <a:prstGeom prst="rect">
             <a:avLst/>
@@ -4710,18 +4679,23 @@
           </a:bodyPr>
           <a:lstStyle/>
           <a:p>
+            <a:pPr lvl="0"/>
+            <a:r>
+              <a:rPr lang="en-US" sz="2800" dirty="0">
+                <a:solidFill>
+                  <a:prstClr val="black"/>
+                </a:solidFill>
+              </a:rPr>
+              <a:t>Curtains are stationary, narrow in latitude, and persist for at least multiple seconds. We found evidence that some curtains are continuously precipitating. Maybe curtains are the higher energy tail of the aurora?</a:t>
+            </a:r>
+          </a:p>
+          <a:p>
+            <a:endParaRPr lang="en-US" sz="3600" b="1" dirty="0"/>
+          </a:p>
+          <a:p>
             <a:r>
               <a:rPr lang="en-US" sz="3600" b="1" dirty="0"/>
               <a:t>Questions?</a:t>
-            </a:r>
-          </a:p>
-          <a:p>
-            <a:endParaRPr lang="en-US" sz="3600" b="1" dirty="0"/>
-          </a:p>
-          <a:p>
-            <a:r>
-              <a:rPr lang="en-US" sz="3000" dirty="0"/>
-              <a:t>Curtains are a stationary and narrow in latitude. Some could be drifting but we found evidence that others are continuously precipitating. Maybe curtains are the higher energy tail of the aurora?</a:t>
             </a:r>
           </a:p>
         </p:txBody>
@@ -4810,7 +4784,7 @@
         </p:blipFill>
         <p:spPr>
           <a:xfrm>
-            <a:off x="838200" y="2077709"/>
+            <a:off x="129284" y="1759212"/>
             <a:ext cx="10515600" cy="3847170"/>
           </a:xfrm>
         </p:spPr>
@@ -4838,7 +4812,7 @@
           <a:p>
             <a:fld id="{6A15CBF3-736A-FD45-AE47-88A67B03EDF7}" type="datetime1">
               <a:rPr lang="en-US" smtClean="0"/>
-              <a:t>11/5/20</a:t>
+              <a:t>11/10/2020</a:t>
             </a:fld>
             <a:endParaRPr lang="en-US"/>
           </a:p>
@@ -4915,7 +4889,7 @@
         </p:nvSpPr>
         <p:spPr>
           <a:xfrm>
-            <a:off x="838200" y="3878826"/>
+            <a:off x="129284" y="3560329"/>
             <a:ext cx="10515600" cy="2046053"/>
           </a:xfrm>
           <a:prstGeom prst="rect">
@@ -5471,7 +5445,7 @@
         </p:blipFill>
         <p:spPr>
           <a:xfrm>
-            <a:off x="4448483" y="261886"/>
+            <a:off x="3610283" y="-291741"/>
             <a:ext cx="7743517" cy="5811838"/>
           </a:xfrm>
         </p:spPr>
@@ -5499,7 +5473,7 @@
           <a:p>
             <a:fld id="{6A15CBF3-736A-FD45-AE47-88A67B03EDF7}" type="datetime1">
               <a:rPr lang="en-US" smtClean="0"/>
-              <a:t>11/3/20</a:t>
+              <a:t>11/10/2020</a:t>
             </a:fld>
             <a:endParaRPr lang="en-US" dirty="0"/>
           </a:p>
@@ -5577,7 +5551,7 @@
         <p:spPr>
           <a:xfrm>
             <a:off x="427703" y="545690"/>
-            <a:ext cx="4020780" cy="5078313"/>
+            <a:ext cx="3610897" cy="3970318"/>
           </a:xfrm>
           <a:prstGeom prst="rect">
             <a:avLst/>
@@ -5591,13 +5565,13 @@
           <a:lstStyle/>
           <a:p>
             <a:r>
-              <a:rPr lang="en-US" sz="3600" dirty="0"/>
+              <a:rPr lang="en-US" sz="2800" dirty="0"/>
               <a:t>Used the orbital velocity to convert from curtain duration to width.</a:t>
             </a:r>
           </a:p>
           <a:p>
             <a:r>
-              <a:rPr lang="en-US" sz="3600" dirty="0"/>
+              <a:rPr lang="en-US" sz="2800" dirty="0"/>
               <a:t>Many curtains are about 10 kilometers wide in latitude, and 90% are less than 20 kilometers wide.</a:t>
             </a:r>
           </a:p>
@@ -5617,7 +5591,7 @@
 </file>
 
 <file path=ppt/slides/slide4.xml><?xml version="1.0" encoding="utf-8"?>
-<p:sld xmlns:a="http://schemas.openxmlformats.org/drawingml/2006/main" xmlns:r="http://schemas.openxmlformats.org/officeDocument/2006/relationships" xmlns:p="http://schemas.openxmlformats.org/presentationml/2006/main" show="0">
+<p:sld xmlns:a="http://schemas.openxmlformats.org/drawingml/2006/main" xmlns:r="http://schemas.openxmlformats.org/officeDocument/2006/relationships" xmlns:p="http://schemas.openxmlformats.org/presentationml/2006/main">
   <p:cSld>
     <p:spTree>
       <p:nvGrpSpPr>
@@ -5691,7 +5665,7 @@
         </p:blipFill>
         <p:spPr>
           <a:xfrm>
-            <a:off x="1238647" y="1462088"/>
+            <a:off x="289369" y="1439555"/>
             <a:ext cx="10148422" cy="5099357"/>
           </a:xfrm>
         </p:spPr>
@@ -5719,7 +5693,7 @@
           <a:p>
             <a:fld id="{6A15CBF3-736A-FD45-AE47-88A67B03EDF7}" type="datetime1">
               <a:rPr lang="en-US" smtClean="0"/>
-              <a:t>11/3/20</a:t>
+              <a:t>11/10/2020</a:t>
             </a:fld>
             <a:endParaRPr lang="en-US"/>
           </a:p>
@@ -5828,13 +5802,20 @@
             <p:ph type="title"/>
           </p:nvPr>
         </p:nvSpPr>
-        <p:spPr/>
-        <p:txBody>
-          <a:bodyPr/>
-          <a:lstStyle/>
-          <a:p>
-            <a:r>
-              <a:rPr lang="en-US" dirty="0"/>
+        <p:spPr>
+          <a:xfrm>
+            <a:off x="838200" y="136525"/>
+            <a:ext cx="10515600" cy="665022"/>
+          </a:xfrm>
+        </p:spPr>
+        <p:txBody>
+          <a:bodyPr>
+            <a:normAutofit/>
+          </a:bodyPr>
+          <a:lstStyle/>
+          <a:p>
+            <a:r>
+              <a:rPr lang="en-US" sz="2800" dirty="0"/>
               <a:t>Curtains are observed at high L, and most often pre-midnight MLT.</a:t>
             </a:r>
           </a:p>
@@ -5864,7 +5845,7 @@
         </p:blipFill>
         <p:spPr>
           <a:xfrm>
-            <a:off x="31080" y="1828800"/>
+            <a:off x="0" y="833377"/>
             <a:ext cx="12147902" cy="4338536"/>
           </a:xfrm>
         </p:spPr>
@@ -5892,7 +5873,7 @@
           <a:p>
             <a:fld id="{6A15CBF3-736A-FD45-AE47-88A67B03EDF7}" type="datetime1">
               <a:rPr lang="en-US" smtClean="0"/>
-              <a:t>11/3/20</a:t>
+              <a:t>11/10/2020</a:t>
             </a:fld>
             <a:endParaRPr lang="en-US"/>
           </a:p>
@@ -5969,7 +5950,7 @@
 </file>
 
 <file path=ppt/slides/slide6.xml><?xml version="1.0" encoding="utf-8"?>
-<p:sld xmlns:a="http://schemas.openxmlformats.org/drawingml/2006/main" xmlns:r="http://schemas.openxmlformats.org/officeDocument/2006/relationships" xmlns:p="http://schemas.openxmlformats.org/presentationml/2006/main">
+<p:sld xmlns:a="http://schemas.openxmlformats.org/drawingml/2006/main" xmlns:r="http://schemas.openxmlformats.org/officeDocument/2006/relationships" xmlns:p="http://schemas.openxmlformats.org/presentationml/2006/main" show="0">
   <p:cSld>
     <p:spTree>
       <p:nvGrpSpPr>
@@ -6065,7 +6046,7 @@
           <a:p>
             <a:fld id="{6A15CBF3-736A-FD45-AE47-88A67B03EDF7}" type="datetime1">
               <a:rPr lang="en-US" smtClean="0"/>
-              <a:t>11/3/20</a:t>
+              <a:t>11/10/2020</a:t>
             </a:fld>
             <a:endParaRPr lang="en-US"/>
           </a:p>
@@ -6182,7 +6163,7 @@
         </p:blipFill>
         <p:spPr>
           <a:xfrm>
-            <a:off x="4009099" y="166021"/>
+            <a:off x="513545" y="166021"/>
             <a:ext cx="7836321" cy="6094917"/>
           </a:xfrm>
         </p:spPr>
@@ -6210,7 +6191,7 @@
           <a:p>
             <a:fld id="{6A15CBF3-736A-FD45-AE47-88A67B03EDF7}" type="datetime1">
               <a:rPr lang="en-US" smtClean="0"/>
-              <a:t>11/5/20</a:t>
+              <a:t>11/10/2020</a:t>
             </a:fld>
             <a:endParaRPr lang="en-US"/>
           </a:p>
@@ -6287,7 +6268,7 @@
         </p:nvSpPr>
         <p:spPr>
           <a:xfrm>
-            <a:off x="339213" y="604684"/>
+            <a:off x="8904487" y="604684"/>
             <a:ext cx="3242187" cy="2677656"/>
           </a:xfrm>
           <a:prstGeom prst="rect">
@@ -6303,7 +6284,7 @@
           <a:p>
             <a:r>
               <a:rPr lang="en-US" sz="2400" dirty="0"/>
-              <a:t>But curtains were observed in the bounce loss cone region in the North Atlantic. Any electrons observed here must precipitate within a bounce period.</a:t>
+              <a:t>Surprisingly, curtains were observed in the bounce loss cone region in the North Atlantic. Any electrons observed here must precipitate within a bounce period.</a:t>
             </a:r>
           </a:p>
         </p:txBody>
@@ -6362,7 +6343,7 @@
         </p:blipFill>
         <p:spPr>
           <a:xfrm>
-            <a:off x="4009099" y="166021"/>
+            <a:off x="513545" y="166021"/>
             <a:ext cx="7836321" cy="6094917"/>
           </a:xfrm>
         </p:spPr>
@@ -6390,7 +6371,7 @@
           <a:p>
             <a:fld id="{6A15CBF3-736A-FD45-AE47-88A67B03EDF7}" type="datetime1">
               <a:rPr lang="en-US" smtClean="0"/>
-              <a:t>11/5/20</a:t>
+              <a:t>11/10/2020</a:t>
             </a:fld>
             <a:endParaRPr lang="en-US"/>
           </a:p>
@@ -6467,7 +6448,7 @@
         </p:nvSpPr>
         <p:spPr>
           <a:xfrm>
-            <a:off x="339213" y="604684"/>
+            <a:off x="8904487" y="604684"/>
             <a:ext cx="3242187" cy="2677656"/>
           </a:xfrm>
           <a:prstGeom prst="rect">
@@ -6483,17 +6464,17 @@
           <a:p>
             <a:r>
               <a:rPr lang="en-US" sz="2400" dirty="0"/>
-              <a:t>But curtains were observed in the bounce loss cone region in the North Atlantic. Any electrons observed here must precipitate within a bounce period.</a:t>
+              <a:t>Surprisingly, curtains were observed in the bounce loss cone region in the North Atlantic. Any electrons observed here must precipitate within a bounce period.</a:t>
             </a:r>
           </a:p>
         </p:txBody>
       </p:sp>
       <p:cxnSp>
         <p:nvCxnSpPr>
-          <p:cNvPr id="11" name="Straight Arrow Connector 10">
-            <a:extLst>
-              <a:ext uri="{FF2B5EF4-FFF2-40B4-BE49-F238E27FC236}">
-                <a16:creationId xmlns:a16="http://schemas.microsoft.com/office/drawing/2014/main" id="{E7A8BD48-B09E-1A43-92D3-BF3334B6084E}"/>
+          <p:cNvPr id="7" name="Straight Arrow Connector 6">
+            <a:extLst>
+              <a:ext uri="{FF2B5EF4-FFF2-40B4-BE49-F238E27FC236}">
+                <a16:creationId xmlns:a16="http://schemas.microsoft.com/office/drawing/2014/main" id="{F35A387D-7F78-414A-959B-D439CB7AEA17}"/>
               </a:ext>
             </a:extLst>
           </p:cNvPr>
@@ -6502,7 +6483,7 @@
         </p:nvCxnSpPr>
         <p:spPr>
           <a:xfrm>
-            <a:off x="4395020" y="1902543"/>
+            <a:off x="968910" y="1902543"/>
             <a:ext cx="1150374" cy="471948"/>
           </a:xfrm>
           <a:prstGeom prst="straightConnector1">
@@ -6533,7 +6514,7 @@
     </p:spTree>
     <p:extLst>
       <p:ext uri="{BB962C8B-B14F-4D97-AF65-F5344CB8AC3E}">
-        <p14:creationId xmlns:p14="http://schemas.microsoft.com/office/powerpoint/2010/main" val="1610562912"/>
+        <p14:creationId xmlns:p14="http://schemas.microsoft.com/office/powerpoint/2010/main" val="1255024436"/>
       </p:ext>
     </p:extLst>
   </p:cSld>
@@ -6584,7 +6565,7 @@
         </p:blipFill>
         <p:spPr>
           <a:xfrm>
-            <a:off x="4009099" y="166021"/>
+            <a:off x="513545" y="166021"/>
             <a:ext cx="7836321" cy="6094917"/>
           </a:xfrm>
         </p:spPr>
@@ -6612,7 +6593,7 @@
           <a:p>
             <a:fld id="{6A15CBF3-736A-FD45-AE47-88A67B03EDF7}" type="datetime1">
               <a:rPr lang="en-US" smtClean="0"/>
-              <a:t>11/5/20</a:t>
+              <a:t>11/10/2020</a:t>
             </a:fld>
             <a:endParaRPr lang="en-US"/>
           </a:p>
@@ -6689,7 +6670,7 @@
         </p:nvSpPr>
         <p:spPr>
           <a:xfrm>
-            <a:off x="339213" y="604684"/>
+            <a:off x="8904487" y="604684"/>
             <a:ext cx="3242187" cy="2677656"/>
           </a:xfrm>
           <a:prstGeom prst="rect">
@@ -6705,17 +6686,17 @@
           <a:p>
             <a:r>
               <a:rPr lang="en-US" sz="2400" dirty="0"/>
-              <a:t>But curtains were observed in the bounce loss cone region in the North Atlantic. Any electrons observed here must precipitate within a bounce period.</a:t>
+              <a:t>Surprisingly, curtains were observed in the bounce loss cone region in the North Atlantic. Any electrons observed here must precipitate within a bounce period.</a:t>
             </a:r>
           </a:p>
         </p:txBody>
       </p:sp>
       <p:cxnSp>
         <p:nvCxnSpPr>
-          <p:cNvPr id="11" name="Straight Arrow Connector 10">
-            <a:extLst>
-              <a:ext uri="{FF2B5EF4-FFF2-40B4-BE49-F238E27FC236}">
-                <a16:creationId xmlns:a16="http://schemas.microsoft.com/office/drawing/2014/main" id="{E7A8BD48-B09E-1A43-92D3-BF3334B6084E}"/>
+          <p:cNvPr id="7" name="Straight Arrow Connector 6">
+            <a:extLst>
+              <a:ext uri="{FF2B5EF4-FFF2-40B4-BE49-F238E27FC236}">
+                <a16:creationId xmlns:a16="http://schemas.microsoft.com/office/drawing/2014/main" id="{F35A387D-7F78-414A-959B-D439CB7AEA17}"/>
               </a:ext>
             </a:extLst>
           </p:cNvPr>
@@ -6724,7 +6705,7 @@
         </p:nvCxnSpPr>
         <p:spPr>
           <a:xfrm>
-            <a:off x="4586749" y="2025562"/>
+            <a:off x="922610" y="2110889"/>
             <a:ext cx="1150374" cy="471948"/>
           </a:xfrm>
           <a:prstGeom prst="straightConnector1">
@@ -6755,7 +6736,7 @@
     </p:spTree>
     <p:extLst>
       <p:ext uri="{BB962C8B-B14F-4D97-AF65-F5344CB8AC3E}">
-        <p14:creationId xmlns:p14="http://schemas.microsoft.com/office/powerpoint/2010/main" val="309078725"/>
+        <p14:creationId xmlns:p14="http://schemas.microsoft.com/office/powerpoint/2010/main" val="3700542300"/>
       </p:ext>
     </p:extLst>
   </p:cSld>

</xml_diff>

<commit_message>
Made more edits. Trying out a new way to "surface" after every slide.
Signed-off-by: unknown <msshumko@gmail.com>
</commit_message>
<xml_diff>
--- a/reports/2020_shumko_agu_slides.pptx
+++ b/reports/2020_shumko_agu_slides.pptx
@@ -5,19 +5,22 @@
     <p:sldMasterId id="2147483648" r:id="rId1"/>
   </p:sldMasterIdLst>
   <p:notesMasterIdLst>
-    <p:notesMasterId r:id="rId12"/>
+    <p:notesMasterId r:id="rId15"/>
   </p:notesMasterIdLst>
   <p:sldIdLst>
     <p:sldId id="256" r:id="rId2"/>
-    <p:sldId id="257" r:id="rId3"/>
-    <p:sldId id="258" r:id="rId4"/>
-    <p:sldId id="259" r:id="rId5"/>
-    <p:sldId id="260" r:id="rId6"/>
-    <p:sldId id="261" r:id="rId7"/>
-    <p:sldId id="262" r:id="rId8"/>
-    <p:sldId id="266" r:id="rId9"/>
-    <p:sldId id="267" r:id="rId10"/>
-    <p:sldId id="265" r:id="rId11"/>
+    <p:sldId id="272" r:id="rId3"/>
+    <p:sldId id="257" r:id="rId4"/>
+    <p:sldId id="258" r:id="rId5"/>
+    <p:sldId id="259" r:id="rId6"/>
+    <p:sldId id="260" r:id="rId7"/>
+    <p:sldId id="261" r:id="rId8"/>
+    <p:sldId id="262" r:id="rId9"/>
+    <p:sldId id="266" r:id="rId10"/>
+    <p:sldId id="267" r:id="rId11"/>
+    <p:sldId id="273" r:id="rId12"/>
+    <p:sldId id="271" r:id="rId13"/>
+    <p:sldId id="265" r:id="rId14"/>
   </p:sldIdLst>
   <p:sldSz cx="12192000" cy="6858000"/>
   <p:notesSz cx="6858000" cy="9144000"/>
@@ -681,7 +684,7 @@
           <a:p>
             <a:fld id="{80735E49-1439-6B48-B6E8-4CB903FA9C2D}" type="slidenum">
               <a:rPr lang="en-US" smtClean="0"/>
-              <a:t>2</a:t>
+              <a:t>3</a:t>
             </a:fld>
             <a:endParaRPr lang="en-US"/>
           </a:p>
@@ -786,7 +789,7 @@
           <a:p>
             <a:fld id="{80735E49-1439-6B48-B6E8-4CB903FA9C2D}" type="slidenum">
               <a:rPr lang="en-US" smtClean="0"/>
-              <a:t>7</a:t>
+              <a:t>8</a:t>
             </a:fld>
             <a:endParaRPr lang="en-US"/>
           </a:p>
@@ -891,7 +894,7 @@
           <a:p>
             <a:fld id="{80735E49-1439-6B48-B6E8-4CB903FA9C2D}" type="slidenum">
               <a:rPr lang="en-US" smtClean="0"/>
-              <a:t>8</a:t>
+              <a:t>9</a:t>
             </a:fld>
             <a:endParaRPr lang="en-US"/>
           </a:p>
@@ -996,7 +999,7 @@
           <a:p>
             <a:fld id="{80735E49-1439-6B48-B6E8-4CB903FA9C2D}" type="slidenum">
               <a:rPr lang="en-US" smtClean="0"/>
-              <a:t>9</a:t>
+              <a:t>10</a:t>
             </a:fld>
             <a:endParaRPr lang="en-US"/>
           </a:p>
@@ -4536,6 +4539,562 @@
           <a:chExt cx="0" cy="0"/>
         </a:xfrm>
       </p:grpSpPr>
+      <p:pic>
+        <p:nvPicPr>
+          <p:cNvPr id="8" name="Content Placeholder 7">
+            <a:extLst>
+              <a:ext uri="{FF2B5EF4-FFF2-40B4-BE49-F238E27FC236}">
+                <a16:creationId xmlns:a16="http://schemas.microsoft.com/office/drawing/2014/main" id="{086BCC93-8253-6C45-B5DB-B732AADCC34D}"/>
+              </a:ext>
+            </a:extLst>
+          </p:cNvPr>
+          <p:cNvPicPr>
+            <a:picLocks noGrp="1" noChangeAspect="1"/>
+          </p:cNvPicPr>
+          <p:nvPr>
+            <p:ph idx="1"/>
+          </p:nvPr>
+        </p:nvPicPr>
+        <p:blipFill>
+          <a:blip r:embed="rId3"/>
+          <a:stretch>
+            <a:fillRect/>
+          </a:stretch>
+        </p:blipFill>
+        <p:spPr>
+          <a:xfrm>
+            <a:off x="513545" y="166021"/>
+            <a:ext cx="7836321" cy="6094917"/>
+          </a:xfrm>
+        </p:spPr>
+      </p:pic>
+      <p:sp>
+        <p:nvSpPr>
+          <p:cNvPr id="4" name="Date Placeholder 3">
+            <a:extLst>
+              <a:ext uri="{FF2B5EF4-FFF2-40B4-BE49-F238E27FC236}">
+                <a16:creationId xmlns:a16="http://schemas.microsoft.com/office/drawing/2014/main" id="{B0B898B3-5ABC-BC48-829D-EFAFA9622F8D}"/>
+              </a:ext>
+            </a:extLst>
+          </p:cNvPr>
+          <p:cNvSpPr>
+            <a:spLocks noGrp="1"/>
+          </p:cNvSpPr>
+          <p:nvPr>
+            <p:ph type="dt" sz="half" idx="10"/>
+          </p:nvPr>
+        </p:nvSpPr>
+        <p:spPr/>
+        <p:txBody>
+          <a:bodyPr/>
+          <a:lstStyle/>
+          <a:p>
+            <a:fld id="{6A15CBF3-736A-FD45-AE47-88A67B03EDF7}" type="datetime1">
+              <a:rPr lang="en-US" smtClean="0"/>
+              <a:t>11/10/2020</a:t>
+            </a:fld>
+            <a:endParaRPr lang="en-US"/>
+          </a:p>
+        </p:txBody>
+      </p:sp>
+      <p:sp>
+        <p:nvSpPr>
+          <p:cNvPr id="5" name="Footer Placeholder 4">
+            <a:extLst>
+              <a:ext uri="{FF2B5EF4-FFF2-40B4-BE49-F238E27FC236}">
+                <a16:creationId xmlns:a16="http://schemas.microsoft.com/office/drawing/2014/main" id="{AB62E9E1-1711-874C-BEE7-6C2CB480001F}"/>
+              </a:ext>
+            </a:extLst>
+          </p:cNvPr>
+          <p:cNvSpPr>
+            <a:spLocks noGrp="1"/>
+          </p:cNvSpPr>
+          <p:nvPr>
+            <p:ph type="ftr" sz="quarter" idx="11"/>
+          </p:nvPr>
+        </p:nvSpPr>
+        <p:spPr/>
+        <p:txBody>
+          <a:bodyPr/>
+          <a:lstStyle/>
+          <a:p>
+            <a:r>
+              <a:rPr lang="en-US"/>
+              <a:t>Mykhaylo Shumko | SM023-08</a:t>
+            </a:r>
+          </a:p>
+        </p:txBody>
+      </p:sp>
+      <p:sp>
+        <p:nvSpPr>
+          <p:cNvPr id="6" name="Slide Number Placeholder 5">
+            <a:extLst>
+              <a:ext uri="{FF2B5EF4-FFF2-40B4-BE49-F238E27FC236}">
+                <a16:creationId xmlns:a16="http://schemas.microsoft.com/office/drawing/2014/main" id="{FDE728F9-EA03-CE4E-81EC-827F8595C15C}"/>
+              </a:ext>
+            </a:extLst>
+          </p:cNvPr>
+          <p:cNvSpPr>
+            <a:spLocks noGrp="1"/>
+          </p:cNvSpPr>
+          <p:nvPr>
+            <p:ph type="sldNum" sz="quarter" idx="12"/>
+          </p:nvPr>
+        </p:nvSpPr>
+        <p:spPr/>
+        <p:txBody>
+          <a:bodyPr/>
+          <a:lstStyle/>
+          <a:p>
+            <a:fld id="{81496180-7CCD-9949-9FC6-636262BC9A7B}" type="slidenum">
+              <a:rPr lang="en-US" smtClean="0"/>
+              <a:t>10</a:t>
+            </a:fld>
+            <a:endParaRPr lang="en-US"/>
+          </a:p>
+        </p:txBody>
+      </p:sp>
+      <p:sp>
+        <p:nvSpPr>
+          <p:cNvPr id="9" name="TextBox 8">
+            <a:extLst>
+              <a:ext uri="{FF2B5EF4-FFF2-40B4-BE49-F238E27FC236}">
+                <a16:creationId xmlns:a16="http://schemas.microsoft.com/office/drawing/2014/main" id="{D1E1D30E-536F-8348-8484-97603BC980E1}"/>
+              </a:ext>
+            </a:extLst>
+          </p:cNvPr>
+          <p:cNvSpPr txBox="1"/>
+          <p:nvPr/>
+        </p:nvSpPr>
+        <p:spPr>
+          <a:xfrm>
+            <a:off x="8904487" y="604684"/>
+            <a:ext cx="3242187" cy="2677656"/>
+          </a:xfrm>
+          <a:prstGeom prst="rect">
+            <a:avLst/>
+          </a:prstGeom>
+          <a:noFill/>
+        </p:spPr>
+        <p:txBody>
+          <a:bodyPr wrap="square" rtlCol="0">
+            <a:spAutoFit/>
+          </a:bodyPr>
+          <a:lstStyle/>
+          <a:p>
+            <a:r>
+              <a:rPr lang="en-US" sz="2400" dirty="0"/>
+              <a:t>Surprisingly, curtains were observed in the bounce loss cone region in the North Atlantic. Any electrons observed here must precipitate within a bounce period.</a:t>
+            </a:r>
+          </a:p>
+        </p:txBody>
+      </p:sp>
+      <p:cxnSp>
+        <p:nvCxnSpPr>
+          <p:cNvPr id="7" name="Straight Arrow Connector 6">
+            <a:extLst>
+              <a:ext uri="{FF2B5EF4-FFF2-40B4-BE49-F238E27FC236}">
+                <a16:creationId xmlns:a16="http://schemas.microsoft.com/office/drawing/2014/main" id="{F35A387D-7F78-414A-959B-D439CB7AEA17}"/>
+              </a:ext>
+            </a:extLst>
+          </p:cNvPr>
+          <p:cNvCxnSpPr/>
+          <p:nvPr/>
+        </p:nvCxnSpPr>
+        <p:spPr>
+          <a:xfrm>
+            <a:off x="922610" y="2110889"/>
+            <a:ext cx="1150374" cy="471948"/>
+          </a:xfrm>
+          <a:prstGeom prst="straightConnector1">
+            <a:avLst/>
+          </a:prstGeom>
+          <a:ln w="76200">
+            <a:solidFill>
+              <a:srgbClr val="FF0000"/>
+            </a:solidFill>
+            <a:tailEnd type="triangle"/>
+          </a:ln>
+        </p:spPr>
+        <p:style>
+          <a:lnRef idx="1">
+            <a:schemeClr val="accent1"/>
+          </a:lnRef>
+          <a:fillRef idx="0">
+            <a:schemeClr val="accent1"/>
+          </a:fillRef>
+          <a:effectRef idx="0">
+            <a:schemeClr val="accent1"/>
+          </a:effectRef>
+          <a:fontRef idx="minor">
+            <a:schemeClr val="tx1"/>
+          </a:fontRef>
+        </p:style>
+      </p:cxnSp>
+    </p:spTree>
+    <p:extLst>
+      <p:ext uri="{BB962C8B-B14F-4D97-AF65-F5344CB8AC3E}">
+        <p14:creationId xmlns:p14="http://schemas.microsoft.com/office/powerpoint/2010/main" val="3700542300"/>
+      </p:ext>
+    </p:extLst>
+  </p:cSld>
+  <p:clrMapOvr>
+    <a:masterClrMapping/>
+  </p:clrMapOvr>
+</p:sld>
+</file>
+
+<file path=ppt/slides/slide11.xml><?xml version="1.0" encoding="utf-8"?>
+<p:sld xmlns:a="http://schemas.openxmlformats.org/drawingml/2006/main" xmlns:r="http://schemas.openxmlformats.org/officeDocument/2006/relationships" xmlns:p="http://schemas.openxmlformats.org/presentationml/2006/main">
+  <p:cSld>
+    <p:spTree>
+      <p:nvGrpSpPr>
+        <p:cNvPr id="1" name=""/>
+        <p:cNvGrpSpPr/>
+        <p:nvPr/>
+      </p:nvGrpSpPr>
+      <p:grpSpPr>
+        <a:xfrm>
+          <a:off x="0" y="0"/>
+          <a:ext cx="0" cy="0"/>
+          <a:chOff x="0" y="0"/>
+          <a:chExt cx="0" cy="0"/>
+        </a:xfrm>
+      </p:grpSpPr>
+      <p:sp>
+        <p:nvSpPr>
+          <p:cNvPr id="2" name="Title 1">
+            <a:extLst>
+              <a:ext uri="{FF2B5EF4-FFF2-40B4-BE49-F238E27FC236}">
+                <a16:creationId xmlns:a16="http://schemas.microsoft.com/office/drawing/2014/main" id="{298E9B5D-8637-457C-8608-4D4579F500DF}"/>
+              </a:ext>
+            </a:extLst>
+          </p:cNvPr>
+          <p:cNvSpPr>
+            <a:spLocks noGrp="1"/>
+          </p:cNvSpPr>
+          <p:nvPr>
+            <p:ph type="title"/>
+          </p:nvPr>
+        </p:nvSpPr>
+        <p:spPr>
+          <a:xfrm>
+            <a:off x="838200" y="365125"/>
+            <a:ext cx="10515600" cy="5422217"/>
+          </a:xfrm>
+        </p:spPr>
+        <p:txBody>
+          <a:bodyPr>
+            <a:normAutofit/>
+          </a:bodyPr>
+          <a:lstStyle/>
+          <a:p>
+            <a:r>
+              <a:rPr lang="en-US" dirty="0"/>
+              <a:t>Electron curtains are a stationary, latitudinally narrow, and persistent form of &gt; 30 keV precipitation into the atmosphere.</a:t>
+            </a:r>
+          </a:p>
+        </p:txBody>
+      </p:sp>
+      <p:sp>
+        <p:nvSpPr>
+          <p:cNvPr id="4" name="Date Placeholder 3">
+            <a:extLst>
+              <a:ext uri="{FF2B5EF4-FFF2-40B4-BE49-F238E27FC236}">
+                <a16:creationId xmlns:a16="http://schemas.microsoft.com/office/drawing/2014/main" id="{368B6903-AA7F-458B-9215-ADC95354735C}"/>
+              </a:ext>
+            </a:extLst>
+          </p:cNvPr>
+          <p:cNvSpPr>
+            <a:spLocks noGrp="1"/>
+          </p:cNvSpPr>
+          <p:nvPr>
+            <p:ph type="dt" sz="half" idx="10"/>
+          </p:nvPr>
+        </p:nvSpPr>
+        <p:spPr/>
+        <p:txBody>
+          <a:bodyPr/>
+          <a:lstStyle/>
+          <a:p>
+            <a:fld id="{6A15CBF3-736A-FD45-AE47-88A67B03EDF7}" type="datetime1">
+              <a:rPr lang="en-US" smtClean="0"/>
+              <a:t>11/10/2020</a:t>
+            </a:fld>
+            <a:endParaRPr lang="en-US"/>
+          </a:p>
+        </p:txBody>
+      </p:sp>
+      <p:sp>
+        <p:nvSpPr>
+          <p:cNvPr id="5" name="Footer Placeholder 4">
+            <a:extLst>
+              <a:ext uri="{FF2B5EF4-FFF2-40B4-BE49-F238E27FC236}">
+                <a16:creationId xmlns:a16="http://schemas.microsoft.com/office/drawing/2014/main" id="{5ECFAEA5-DB3F-4B44-8365-868E2121F13C}"/>
+              </a:ext>
+            </a:extLst>
+          </p:cNvPr>
+          <p:cNvSpPr>
+            <a:spLocks noGrp="1"/>
+          </p:cNvSpPr>
+          <p:nvPr>
+            <p:ph type="ftr" sz="quarter" idx="11"/>
+          </p:nvPr>
+        </p:nvSpPr>
+        <p:spPr/>
+        <p:txBody>
+          <a:bodyPr/>
+          <a:lstStyle/>
+          <a:p>
+            <a:r>
+              <a:rPr lang="en-US"/>
+              <a:t>Mykhaylo Shumko | SM023-08</a:t>
+            </a:r>
+          </a:p>
+        </p:txBody>
+      </p:sp>
+      <p:sp>
+        <p:nvSpPr>
+          <p:cNvPr id="6" name="Slide Number Placeholder 5">
+            <a:extLst>
+              <a:ext uri="{FF2B5EF4-FFF2-40B4-BE49-F238E27FC236}">
+                <a16:creationId xmlns:a16="http://schemas.microsoft.com/office/drawing/2014/main" id="{E4FB0C7A-BF62-4FBE-BC45-F15B93CD5235}"/>
+              </a:ext>
+            </a:extLst>
+          </p:cNvPr>
+          <p:cNvSpPr>
+            <a:spLocks noGrp="1"/>
+          </p:cNvSpPr>
+          <p:nvPr>
+            <p:ph type="sldNum" sz="quarter" idx="12"/>
+          </p:nvPr>
+        </p:nvSpPr>
+        <p:spPr/>
+        <p:txBody>
+          <a:bodyPr/>
+          <a:lstStyle/>
+          <a:p>
+            <a:fld id="{81496180-7CCD-9949-9FC6-636262BC9A7B}" type="slidenum">
+              <a:rPr lang="en-US" smtClean="0"/>
+              <a:t>11</a:t>
+            </a:fld>
+            <a:endParaRPr lang="en-US"/>
+          </a:p>
+        </p:txBody>
+      </p:sp>
+    </p:spTree>
+    <p:extLst>
+      <p:ext uri="{BB962C8B-B14F-4D97-AF65-F5344CB8AC3E}">
+        <p14:creationId xmlns:p14="http://schemas.microsoft.com/office/powerpoint/2010/main" val="4162139184"/>
+      </p:ext>
+    </p:extLst>
+  </p:cSld>
+  <p:clrMapOvr>
+    <a:masterClrMapping/>
+  </p:clrMapOvr>
+</p:sld>
+</file>
+
+<file path=ppt/slides/slide12.xml><?xml version="1.0" encoding="utf-8"?>
+<p:sld xmlns:a="http://schemas.openxmlformats.org/drawingml/2006/main" xmlns:r="http://schemas.openxmlformats.org/officeDocument/2006/relationships" xmlns:p="http://schemas.openxmlformats.org/presentationml/2006/main">
+  <p:cSld>
+    <p:spTree>
+      <p:nvGrpSpPr>
+        <p:cNvPr id="1" name=""/>
+        <p:cNvGrpSpPr/>
+        <p:nvPr/>
+      </p:nvGrpSpPr>
+      <p:grpSpPr>
+        <a:xfrm>
+          <a:off x="0" y="0"/>
+          <a:ext cx="0" cy="0"/>
+          <a:chOff x="0" y="0"/>
+          <a:chExt cx="0" cy="0"/>
+        </a:xfrm>
+      </p:grpSpPr>
+      <p:sp>
+        <p:nvSpPr>
+          <p:cNvPr id="2" name="Title 1">
+            <a:extLst>
+              <a:ext uri="{FF2B5EF4-FFF2-40B4-BE49-F238E27FC236}">
+                <a16:creationId xmlns:a16="http://schemas.microsoft.com/office/drawing/2014/main" id="{298E9B5D-8637-457C-8608-4D4579F500DF}"/>
+              </a:ext>
+            </a:extLst>
+          </p:cNvPr>
+          <p:cNvSpPr>
+            <a:spLocks noGrp="1"/>
+          </p:cNvSpPr>
+          <p:nvPr>
+            <p:ph type="title"/>
+          </p:nvPr>
+        </p:nvSpPr>
+        <p:spPr>
+          <a:xfrm>
+            <a:off x="838200" y="365125"/>
+            <a:ext cx="10515600" cy="5422217"/>
+          </a:xfrm>
+        </p:spPr>
+        <p:txBody>
+          <a:bodyPr>
+            <a:normAutofit/>
+          </a:bodyPr>
+          <a:lstStyle/>
+          <a:p>
+            <a:r>
+              <a:rPr lang="en-US" dirty="0"/>
+              <a:t>Electron </a:t>
+            </a:r>
+            <a:r>
+              <a:rPr lang="en-US"/>
+              <a:t>curtains with </a:t>
+            </a:r>
+            <a:r>
+              <a:rPr lang="en-US" dirty="0"/>
+              <a:t>&gt; 30 keV energies are stationary, latitudinally narrower than </a:t>
+            </a:r>
+            <a:r>
+              <a:rPr lang="en-US" dirty="0">
+                <a:solidFill>
+                  <a:srgbClr val="FF0000"/>
+                </a:solidFill>
+              </a:rPr>
+              <a:t>20 km, occur more often at high L shells and pre-midnight MLT,</a:t>
+            </a:r>
+            <a:r>
+              <a:rPr lang="en-US" dirty="0"/>
+              <a:t> and some </a:t>
+            </a:r>
+            <a:r>
+              <a:rPr lang="en-US" dirty="0">
+                <a:solidFill>
+                  <a:srgbClr val="FF0000"/>
+                </a:solidFill>
+              </a:rPr>
+              <a:t>precipitate for at least multiple seconds </a:t>
+            </a:r>
+            <a:r>
+              <a:rPr lang="en-US" dirty="0"/>
+              <a:t>into the atmosphere.</a:t>
+            </a:r>
+          </a:p>
+        </p:txBody>
+      </p:sp>
+      <p:sp>
+        <p:nvSpPr>
+          <p:cNvPr id="4" name="Date Placeholder 3">
+            <a:extLst>
+              <a:ext uri="{FF2B5EF4-FFF2-40B4-BE49-F238E27FC236}">
+                <a16:creationId xmlns:a16="http://schemas.microsoft.com/office/drawing/2014/main" id="{368B6903-AA7F-458B-9215-ADC95354735C}"/>
+              </a:ext>
+            </a:extLst>
+          </p:cNvPr>
+          <p:cNvSpPr>
+            <a:spLocks noGrp="1"/>
+          </p:cNvSpPr>
+          <p:nvPr>
+            <p:ph type="dt" sz="half" idx="10"/>
+          </p:nvPr>
+        </p:nvSpPr>
+        <p:spPr/>
+        <p:txBody>
+          <a:bodyPr/>
+          <a:lstStyle/>
+          <a:p>
+            <a:fld id="{6A15CBF3-736A-FD45-AE47-88A67B03EDF7}" type="datetime1">
+              <a:rPr lang="en-US" smtClean="0"/>
+              <a:t>11/10/2020</a:t>
+            </a:fld>
+            <a:endParaRPr lang="en-US"/>
+          </a:p>
+        </p:txBody>
+      </p:sp>
+      <p:sp>
+        <p:nvSpPr>
+          <p:cNvPr id="5" name="Footer Placeholder 4">
+            <a:extLst>
+              <a:ext uri="{FF2B5EF4-FFF2-40B4-BE49-F238E27FC236}">
+                <a16:creationId xmlns:a16="http://schemas.microsoft.com/office/drawing/2014/main" id="{5ECFAEA5-DB3F-4B44-8365-868E2121F13C}"/>
+              </a:ext>
+            </a:extLst>
+          </p:cNvPr>
+          <p:cNvSpPr>
+            <a:spLocks noGrp="1"/>
+          </p:cNvSpPr>
+          <p:nvPr>
+            <p:ph type="ftr" sz="quarter" idx="11"/>
+          </p:nvPr>
+        </p:nvSpPr>
+        <p:spPr/>
+        <p:txBody>
+          <a:bodyPr/>
+          <a:lstStyle/>
+          <a:p>
+            <a:r>
+              <a:rPr lang="en-US"/>
+              <a:t>Mykhaylo Shumko | SM023-08</a:t>
+            </a:r>
+          </a:p>
+        </p:txBody>
+      </p:sp>
+      <p:sp>
+        <p:nvSpPr>
+          <p:cNvPr id="6" name="Slide Number Placeholder 5">
+            <a:extLst>
+              <a:ext uri="{FF2B5EF4-FFF2-40B4-BE49-F238E27FC236}">
+                <a16:creationId xmlns:a16="http://schemas.microsoft.com/office/drawing/2014/main" id="{E4FB0C7A-BF62-4FBE-BC45-F15B93CD5235}"/>
+              </a:ext>
+            </a:extLst>
+          </p:cNvPr>
+          <p:cNvSpPr>
+            <a:spLocks noGrp="1"/>
+          </p:cNvSpPr>
+          <p:nvPr>
+            <p:ph type="sldNum" sz="quarter" idx="12"/>
+          </p:nvPr>
+        </p:nvSpPr>
+        <p:spPr/>
+        <p:txBody>
+          <a:bodyPr/>
+          <a:lstStyle/>
+          <a:p>
+            <a:fld id="{81496180-7CCD-9949-9FC6-636262BC9A7B}" type="slidenum">
+              <a:rPr lang="en-US" smtClean="0"/>
+              <a:t>12</a:t>
+            </a:fld>
+            <a:endParaRPr lang="en-US"/>
+          </a:p>
+        </p:txBody>
+      </p:sp>
+    </p:spTree>
+    <p:extLst>
+      <p:ext uri="{BB962C8B-B14F-4D97-AF65-F5344CB8AC3E}">
+        <p14:creationId xmlns:p14="http://schemas.microsoft.com/office/powerpoint/2010/main" val="1532778976"/>
+      </p:ext>
+    </p:extLst>
+  </p:cSld>
+  <p:clrMapOvr>
+    <a:masterClrMapping/>
+  </p:clrMapOvr>
+</p:sld>
+</file>
+
+<file path=ppt/slides/slide13.xml><?xml version="1.0" encoding="utf-8"?>
+<p:sld xmlns:a="http://schemas.openxmlformats.org/drawingml/2006/main" xmlns:r="http://schemas.openxmlformats.org/officeDocument/2006/relationships" xmlns:p="http://schemas.openxmlformats.org/presentationml/2006/main">
+  <p:cSld>
+    <p:spTree>
+      <p:nvGrpSpPr>
+        <p:cNvPr id="1" name=""/>
+        <p:cNvGrpSpPr/>
+        <p:nvPr/>
+      </p:nvGrpSpPr>
+      <p:grpSpPr>
+        <a:xfrm>
+          <a:off x="0" y="0"/>
+          <a:ext cx="0" cy="0"/>
+          <a:chOff x="0" y="0"/>
+          <a:chExt cx="0" cy="0"/>
+        </a:xfrm>
+      </p:grpSpPr>
       <p:sp>
         <p:nvSpPr>
           <p:cNvPr id="4" name="Date Placeholder 3">
@@ -4616,7 +5175,7 @@
           <a:p>
             <a:fld id="{81496180-7CCD-9949-9FC6-636262BC9A7B}" type="slidenum">
               <a:rPr lang="en-US" smtClean="0"/>
-              <a:t>10</a:t>
+              <a:t>13</a:t>
             </a:fld>
             <a:endParaRPr lang="en-US"/>
           </a:p>
@@ -4735,6 +5294,157 @@
           <p:cNvPr id="2" name="Title 1">
             <a:extLst>
               <a:ext uri="{FF2B5EF4-FFF2-40B4-BE49-F238E27FC236}">
+                <a16:creationId xmlns:a16="http://schemas.microsoft.com/office/drawing/2014/main" id="{298E9B5D-8637-457C-8608-4D4579F500DF}"/>
+              </a:ext>
+            </a:extLst>
+          </p:cNvPr>
+          <p:cNvSpPr>
+            <a:spLocks noGrp="1"/>
+          </p:cNvSpPr>
+          <p:nvPr>
+            <p:ph type="title"/>
+          </p:nvPr>
+        </p:nvSpPr>
+        <p:spPr>
+          <a:xfrm>
+            <a:off x="838200" y="365125"/>
+            <a:ext cx="10515600" cy="5422217"/>
+          </a:xfrm>
+        </p:spPr>
+        <p:txBody>
+          <a:bodyPr>
+            <a:normAutofit/>
+          </a:bodyPr>
+          <a:lstStyle/>
+          <a:p>
+            <a:r>
+              <a:rPr lang="en-US" dirty="0"/>
+              <a:t>Electron curtains are a stationary, latitudinally narrow, and persistent form of &gt; 30 keV precipitation into the atmosphere.</a:t>
+            </a:r>
+          </a:p>
+        </p:txBody>
+      </p:sp>
+      <p:sp>
+        <p:nvSpPr>
+          <p:cNvPr id="4" name="Date Placeholder 3">
+            <a:extLst>
+              <a:ext uri="{FF2B5EF4-FFF2-40B4-BE49-F238E27FC236}">
+                <a16:creationId xmlns:a16="http://schemas.microsoft.com/office/drawing/2014/main" id="{368B6903-AA7F-458B-9215-ADC95354735C}"/>
+              </a:ext>
+            </a:extLst>
+          </p:cNvPr>
+          <p:cNvSpPr>
+            <a:spLocks noGrp="1"/>
+          </p:cNvSpPr>
+          <p:nvPr>
+            <p:ph type="dt" sz="half" idx="10"/>
+          </p:nvPr>
+        </p:nvSpPr>
+        <p:spPr/>
+        <p:txBody>
+          <a:bodyPr/>
+          <a:lstStyle/>
+          <a:p>
+            <a:fld id="{6A15CBF3-736A-FD45-AE47-88A67B03EDF7}" type="datetime1">
+              <a:rPr lang="en-US" smtClean="0"/>
+              <a:t>11/10/2020</a:t>
+            </a:fld>
+            <a:endParaRPr lang="en-US"/>
+          </a:p>
+        </p:txBody>
+      </p:sp>
+      <p:sp>
+        <p:nvSpPr>
+          <p:cNvPr id="5" name="Footer Placeholder 4">
+            <a:extLst>
+              <a:ext uri="{FF2B5EF4-FFF2-40B4-BE49-F238E27FC236}">
+                <a16:creationId xmlns:a16="http://schemas.microsoft.com/office/drawing/2014/main" id="{5ECFAEA5-DB3F-4B44-8365-868E2121F13C}"/>
+              </a:ext>
+            </a:extLst>
+          </p:cNvPr>
+          <p:cNvSpPr>
+            <a:spLocks noGrp="1"/>
+          </p:cNvSpPr>
+          <p:nvPr>
+            <p:ph type="ftr" sz="quarter" idx="11"/>
+          </p:nvPr>
+        </p:nvSpPr>
+        <p:spPr/>
+        <p:txBody>
+          <a:bodyPr/>
+          <a:lstStyle/>
+          <a:p>
+            <a:r>
+              <a:rPr lang="en-US"/>
+              <a:t>Mykhaylo Shumko | SM023-08</a:t>
+            </a:r>
+          </a:p>
+        </p:txBody>
+      </p:sp>
+      <p:sp>
+        <p:nvSpPr>
+          <p:cNvPr id="6" name="Slide Number Placeholder 5">
+            <a:extLst>
+              <a:ext uri="{FF2B5EF4-FFF2-40B4-BE49-F238E27FC236}">
+                <a16:creationId xmlns:a16="http://schemas.microsoft.com/office/drawing/2014/main" id="{E4FB0C7A-BF62-4FBE-BC45-F15B93CD5235}"/>
+              </a:ext>
+            </a:extLst>
+          </p:cNvPr>
+          <p:cNvSpPr>
+            <a:spLocks noGrp="1"/>
+          </p:cNvSpPr>
+          <p:nvPr>
+            <p:ph type="sldNum" sz="quarter" idx="12"/>
+          </p:nvPr>
+        </p:nvSpPr>
+        <p:spPr/>
+        <p:txBody>
+          <a:bodyPr/>
+          <a:lstStyle/>
+          <a:p>
+            <a:fld id="{81496180-7CCD-9949-9FC6-636262BC9A7B}" type="slidenum">
+              <a:rPr lang="en-US" smtClean="0"/>
+              <a:t>2</a:t>
+            </a:fld>
+            <a:endParaRPr lang="en-US"/>
+          </a:p>
+        </p:txBody>
+      </p:sp>
+    </p:spTree>
+    <p:extLst>
+      <p:ext uri="{BB962C8B-B14F-4D97-AF65-F5344CB8AC3E}">
+        <p14:creationId xmlns:p14="http://schemas.microsoft.com/office/powerpoint/2010/main" val="2112931766"/>
+      </p:ext>
+    </p:extLst>
+  </p:cSld>
+  <p:clrMapOvr>
+    <a:masterClrMapping/>
+  </p:clrMapOvr>
+</p:sld>
+</file>
+
+<file path=ppt/slides/slide3.xml><?xml version="1.0" encoding="utf-8"?>
+<p:sld xmlns:a="http://schemas.openxmlformats.org/drawingml/2006/main" xmlns:r="http://schemas.openxmlformats.org/officeDocument/2006/relationships" xmlns:p="http://schemas.openxmlformats.org/presentationml/2006/main">
+  <p:cSld>
+    <p:spTree>
+      <p:nvGrpSpPr>
+        <p:cNvPr id="1" name=""/>
+        <p:cNvGrpSpPr/>
+        <p:nvPr/>
+      </p:nvGrpSpPr>
+      <p:grpSpPr>
+        <a:xfrm>
+          <a:off x="0" y="0"/>
+          <a:ext cx="0" cy="0"/>
+          <a:chOff x="0" y="0"/>
+          <a:chExt cx="0" cy="0"/>
+        </a:xfrm>
+      </p:grpSpPr>
+      <p:sp>
+        <p:nvSpPr>
+          <p:cNvPr id="2" name="Title 1">
+            <a:extLst>
+              <a:ext uri="{FF2B5EF4-FFF2-40B4-BE49-F238E27FC236}">
                 <a16:creationId xmlns:a16="http://schemas.microsoft.com/office/drawing/2014/main" id="{F52027A1-E789-4B4D-9A4F-3AF97ABE5A78}"/>
               </a:ext>
             </a:extLst>
@@ -4755,7 +5465,7 @@
           <a:p>
             <a:r>
               <a:rPr lang="en-US" sz="3200" dirty="0"/>
-              <a:t>Curtains are latitudinally narrow and persistent &gt; 30 keV electron precipitation into the atmosphere. Distinguished from microbursts using multiple spacecraft.</a:t>
+              <a:t>Curtains are distinguished from microbursts using multiple spacecraft.</a:t>
             </a:r>
           </a:p>
         </p:txBody>
@@ -4869,7 +5579,7 @@
           <a:p>
             <a:fld id="{81496180-7CCD-9949-9FC6-636262BC9A7B}" type="slidenum">
               <a:rPr lang="en-US" smtClean="0"/>
-              <a:t>2</a:t>
+              <a:t>3</a:t>
             </a:fld>
             <a:endParaRPr lang="en-US"/>
           </a:p>
@@ -5404,7 +6114,7 @@
 </p:sld>
 </file>
 
-<file path=ppt/slides/slide3.xml><?xml version="1.0" encoding="utf-8"?>
+<file path=ppt/slides/slide4.xml><?xml version="1.0" encoding="utf-8"?>
 <p:sld xmlns:a="http://schemas.openxmlformats.org/drawingml/2006/main" xmlns:r="http://schemas.openxmlformats.org/officeDocument/2006/relationships" xmlns:p="http://schemas.openxmlformats.org/presentationml/2006/main">
   <p:cSld>
     <p:spTree>
@@ -5530,7 +6240,7 @@
           <a:p>
             <a:fld id="{81496180-7CCD-9949-9FC6-636262BC9A7B}" type="slidenum">
               <a:rPr lang="en-US" smtClean="0"/>
-              <a:t>3</a:t>
+              <a:t>4</a:t>
             </a:fld>
             <a:endParaRPr lang="en-US"/>
           </a:p>
@@ -5581,185 +6291,6 @@
     <p:extLst>
       <p:ext uri="{BB962C8B-B14F-4D97-AF65-F5344CB8AC3E}">
         <p14:creationId xmlns:p14="http://schemas.microsoft.com/office/powerpoint/2010/main" val="1030312781"/>
-      </p:ext>
-    </p:extLst>
-  </p:cSld>
-  <p:clrMapOvr>
-    <a:masterClrMapping/>
-  </p:clrMapOvr>
-</p:sld>
-</file>
-
-<file path=ppt/slides/slide4.xml><?xml version="1.0" encoding="utf-8"?>
-<p:sld xmlns:a="http://schemas.openxmlformats.org/drawingml/2006/main" xmlns:r="http://schemas.openxmlformats.org/officeDocument/2006/relationships" xmlns:p="http://schemas.openxmlformats.org/presentationml/2006/main">
-  <p:cSld>
-    <p:spTree>
-      <p:nvGrpSpPr>
-        <p:cNvPr id="1" name=""/>
-        <p:cNvGrpSpPr/>
-        <p:nvPr/>
-      </p:nvGrpSpPr>
-      <p:grpSpPr>
-        <a:xfrm>
-          <a:off x="0" y="0"/>
-          <a:ext cx="0" cy="0"/>
-          <a:chOff x="0" y="0"/>
-          <a:chExt cx="0" cy="0"/>
-        </a:xfrm>
-      </p:grpSpPr>
-      <p:sp>
-        <p:nvSpPr>
-          <p:cNvPr id="2" name="Title 1">
-            <a:extLst>
-              <a:ext uri="{FF2B5EF4-FFF2-40B4-BE49-F238E27FC236}">
-                <a16:creationId xmlns:a16="http://schemas.microsoft.com/office/drawing/2014/main" id="{4D9CCA20-09B5-7F46-BA13-C4CB8675DDD2}"/>
-              </a:ext>
-            </a:extLst>
-          </p:cNvPr>
-          <p:cNvSpPr>
-            <a:spLocks noGrp="1"/>
-          </p:cNvSpPr>
-          <p:nvPr>
-            <p:ph type="title"/>
-          </p:nvPr>
-        </p:nvSpPr>
-        <p:spPr>
-          <a:xfrm>
-            <a:off x="838200" y="136525"/>
-            <a:ext cx="10515600" cy="1325563"/>
-          </a:xfrm>
-        </p:spPr>
-        <p:txBody>
-          <a:bodyPr>
-            <a:normAutofit fontScale="90000"/>
-          </a:bodyPr>
-          <a:lstStyle/>
-          <a:p>
-            <a:r>
-              <a:rPr lang="en-US" dirty="0"/>
-              <a:t>Curtains occur on the radiation belt footprints, and roughly uniformly in longitude.</a:t>
-            </a:r>
-          </a:p>
-        </p:txBody>
-      </p:sp>
-      <p:pic>
-        <p:nvPicPr>
-          <p:cNvPr id="8" name="Content Placeholder 7">
-            <a:extLst>
-              <a:ext uri="{FF2B5EF4-FFF2-40B4-BE49-F238E27FC236}">
-                <a16:creationId xmlns:a16="http://schemas.microsoft.com/office/drawing/2014/main" id="{4103C661-C720-294B-BB86-257D04C34DB6}"/>
-              </a:ext>
-            </a:extLst>
-          </p:cNvPr>
-          <p:cNvPicPr>
-            <a:picLocks noGrp="1" noChangeAspect="1"/>
-          </p:cNvPicPr>
-          <p:nvPr>
-            <p:ph idx="1"/>
-          </p:nvPr>
-        </p:nvPicPr>
-        <p:blipFill rotWithShape="1">
-          <a:blip r:embed="rId2"/>
-          <a:srcRect l="1289" t="7505" r="-1289" b="3532"/>
-          <a:stretch/>
-        </p:blipFill>
-        <p:spPr>
-          <a:xfrm>
-            <a:off x="289369" y="1439555"/>
-            <a:ext cx="10148422" cy="5099357"/>
-          </a:xfrm>
-        </p:spPr>
-      </p:pic>
-      <p:sp>
-        <p:nvSpPr>
-          <p:cNvPr id="4" name="Date Placeholder 3">
-            <a:extLst>
-              <a:ext uri="{FF2B5EF4-FFF2-40B4-BE49-F238E27FC236}">
-                <a16:creationId xmlns:a16="http://schemas.microsoft.com/office/drawing/2014/main" id="{612A8560-4AE9-9C4A-854C-97280520A4AB}"/>
-              </a:ext>
-            </a:extLst>
-          </p:cNvPr>
-          <p:cNvSpPr>
-            <a:spLocks noGrp="1"/>
-          </p:cNvSpPr>
-          <p:nvPr>
-            <p:ph type="dt" sz="half" idx="10"/>
-          </p:nvPr>
-        </p:nvSpPr>
-        <p:spPr/>
-        <p:txBody>
-          <a:bodyPr/>
-          <a:lstStyle/>
-          <a:p>
-            <a:fld id="{6A15CBF3-736A-FD45-AE47-88A67B03EDF7}" type="datetime1">
-              <a:rPr lang="en-US" smtClean="0"/>
-              <a:t>11/10/2020</a:t>
-            </a:fld>
-            <a:endParaRPr lang="en-US"/>
-          </a:p>
-        </p:txBody>
-      </p:sp>
-      <p:sp>
-        <p:nvSpPr>
-          <p:cNvPr id="5" name="Footer Placeholder 4">
-            <a:extLst>
-              <a:ext uri="{FF2B5EF4-FFF2-40B4-BE49-F238E27FC236}">
-                <a16:creationId xmlns:a16="http://schemas.microsoft.com/office/drawing/2014/main" id="{23F77A9A-B5C8-C641-B8B6-8EE3B31334E4}"/>
-              </a:ext>
-            </a:extLst>
-          </p:cNvPr>
-          <p:cNvSpPr>
-            <a:spLocks noGrp="1"/>
-          </p:cNvSpPr>
-          <p:nvPr>
-            <p:ph type="ftr" sz="quarter" idx="11"/>
-          </p:nvPr>
-        </p:nvSpPr>
-        <p:spPr/>
-        <p:txBody>
-          <a:bodyPr/>
-          <a:lstStyle/>
-          <a:p>
-            <a:r>
-              <a:rPr lang="en-US"/>
-              <a:t>Mykhaylo Shumko | SM023-08</a:t>
-            </a:r>
-          </a:p>
-        </p:txBody>
-      </p:sp>
-      <p:sp>
-        <p:nvSpPr>
-          <p:cNvPr id="6" name="Slide Number Placeholder 5">
-            <a:extLst>
-              <a:ext uri="{FF2B5EF4-FFF2-40B4-BE49-F238E27FC236}">
-                <a16:creationId xmlns:a16="http://schemas.microsoft.com/office/drawing/2014/main" id="{C9CF6518-F995-AA40-A58E-93855433378A}"/>
-              </a:ext>
-            </a:extLst>
-          </p:cNvPr>
-          <p:cNvSpPr>
-            <a:spLocks noGrp="1"/>
-          </p:cNvSpPr>
-          <p:nvPr>
-            <p:ph type="sldNum" sz="quarter" idx="12"/>
-          </p:nvPr>
-        </p:nvSpPr>
-        <p:spPr/>
-        <p:txBody>
-          <a:bodyPr/>
-          <a:lstStyle/>
-          <a:p>
-            <a:fld id="{81496180-7CCD-9949-9FC6-636262BC9A7B}" type="slidenum">
-              <a:rPr lang="en-US" smtClean="0"/>
-              <a:t>4</a:t>
-            </a:fld>
-            <a:endParaRPr lang="en-US"/>
-          </a:p>
-        </p:txBody>
-      </p:sp>
-    </p:spTree>
-    <p:extLst>
-      <p:ext uri="{BB962C8B-B14F-4D97-AF65-F5344CB8AC3E}">
-        <p14:creationId xmlns:p14="http://schemas.microsoft.com/office/powerpoint/2010/main" val="857153895"/>
       </p:ext>
     </p:extLst>
   </p:cSld>
@@ -5791,6 +6322,185 @@
           <p:cNvPr id="2" name="Title 1">
             <a:extLst>
               <a:ext uri="{FF2B5EF4-FFF2-40B4-BE49-F238E27FC236}">
+                <a16:creationId xmlns:a16="http://schemas.microsoft.com/office/drawing/2014/main" id="{4D9CCA20-09B5-7F46-BA13-C4CB8675DDD2}"/>
+              </a:ext>
+            </a:extLst>
+          </p:cNvPr>
+          <p:cNvSpPr>
+            <a:spLocks noGrp="1"/>
+          </p:cNvSpPr>
+          <p:nvPr>
+            <p:ph type="title"/>
+          </p:nvPr>
+        </p:nvSpPr>
+        <p:spPr>
+          <a:xfrm>
+            <a:off x="838200" y="136525"/>
+            <a:ext cx="10515600" cy="1325563"/>
+          </a:xfrm>
+        </p:spPr>
+        <p:txBody>
+          <a:bodyPr>
+            <a:normAutofit fontScale="90000"/>
+          </a:bodyPr>
+          <a:lstStyle/>
+          <a:p>
+            <a:r>
+              <a:rPr lang="en-US" dirty="0"/>
+              <a:t>Curtains occur on the radiation belt footprints, and roughly uniformly in longitude.</a:t>
+            </a:r>
+          </a:p>
+        </p:txBody>
+      </p:sp>
+      <p:pic>
+        <p:nvPicPr>
+          <p:cNvPr id="8" name="Content Placeholder 7">
+            <a:extLst>
+              <a:ext uri="{FF2B5EF4-FFF2-40B4-BE49-F238E27FC236}">
+                <a16:creationId xmlns:a16="http://schemas.microsoft.com/office/drawing/2014/main" id="{4103C661-C720-294B-BB86-257D04C34DB6}"/>
+              </a:ext>
+            </a:extLst>
+          </p:cNvPr>
+          <p:cNvPicPr>
+            <a:picLocks noGrp="1" noChangeAspect="1"/>
+          </p:cNvPicPr>
+          <p:nvPr>
+            <p:ph idx="1"/>
+          </p:nvPr>
+        </p:nvPicPr>
+        <p:blipFill rotWithShape="1">
+          <a:blip r:embed="rId2"/>
+          <a:srcRect l="1289" t="7505" r="-1289" b="3532"/>
+          <a:stretch/>
+        </p:blipFill>
+        <p:spPr>
+          <a:xfrm>
+            <a:off x="289369" y="1439555"/>
+            <a:ext cx="10148422" cy="5099357"/>
+          </a:xfrm>
+        </p:spPr>
+      </p:pic>
+      <p:sp>
+        <p:nvSpPr>
+          <p:cNvPr id="4" name="Date Placeholder 3">
+            <a:extLst>
+              <a:ext uri="{FF2B5EF4-FFF2-40B4-BE49-F238E27FC236}">
+                <a16:creationId xmlns:a16="http://schemas.microsoft.com/office/drawing/2014/main" id="{612A8560-4AE9-9C4A-854C-97280520A4AB}"/>
+              </a:ext>
+            </a:extLst>
+          </p:cNvPr>
+          <p:cNvSpPr>
+            <a:spLocks noGrp="1"/>
+          </p:cNvSpPr>
+          <p:nvPr>
+            <p:ph type="dt" sz="half" idx="10"/>
+          </p:nvPr>
+        </p:nvSpPr>
+        <p:spPr/>
+        <p:txBody>
+          <a:bodyPr/>
+          <a:lstStyle/>
+          <a:p>
+            <a:fld id="{6A15CBF3-736A-FD45-AE47-88A67B03EDF7}" type="datetime1">
+              <a:rPr lang="en-US" smtClean="0"/>
+              <a:t>11/10/2020</a:t>
+            </a:fld>
+            <a:endParaRPr lang="en-US"/>
+          </a:p>
+        </p:txBody>
+      </p:sp>
+      <p:sp>
+        <p:nvSpPr>
+          <p:cNvPr id="5" name="Footer Placeholder 4">
+            <a:extLst>
+              <a:ext uri="{FF2B5EF4-FFF2-40B4-BE49-F238E27FC236}">
+                <a16:creationId xmlns:a16="http://schemas.microsoft.com/office/drawing/2014/main" id="{23F77A9A-B5C8-C641-B8B6-8EE3B31334E4}"/>
+              </a:ext>
+            </a:extLst>
+          </p:cNvPr>
+          <p:cNvSpPr>
+            <a:spLocks noGrp="1"/>
+          </p:cNvSpPr>
+          <p:nvPr>
+            <p:ph type="ftr" sz="quarter" idx="11"/>
+          </p:nvPr>
+        </p:nvSpPr>
+        <p:spPr/>
+        <p:txBody>
+          <a:bodyPr/>
+          <a:lstStyle/>
+          <a:p>
+            <a:r>
+              <a:rPr lang="en-US"/>
+              <a:t>Mykhaylo Shumko | SM023-08</a:t>
+            </a:r>
+          </a:p>
+        </p:txBody>
+      </p:sp>
+      <p:sp>
+        <p:nvSpPr>
+          <p:cNvPr id="6" name="Slide Number Placeholder 5">
+            <a:extLst>
+              <a:ext uri="{FF2B5EF4-FFF2-40B4-BE49-F238E27FC236}">
+                <a16:creationId xmlns:a16="http://schemas.microsoft.com/office/drawing/2014/main" id="{C9CF6518-F995-AA40-A58E-93855433378A}"/>
+              </a:ext>
+            </a:extLst>
+          </p:cNvPr>
+          <p:cNvSpPr>
+            <a:spLocks noGrp="1"/>
+          </p:cNvSpPr>
+          <p:nvPr>
+            <p:ph type="sldNum" sz="quarter" idx="12"/>
+          </p:nvPr>
+        </p:nvSpPr>
+        <p:spPr/>
+        <p:txBody>
+          <a:bodyPr/>
+          <a:lstStyle/>
+          <a:p>
+            <a:fld id="{81496180-7CCD-9949-9FC6-636262BC9A7B}" type="slidenum">
+              <a:rPr lang="en-US" smtClean="0"/>
+              <a:t>5</a:t>
+            </a:fld>
+            <a:endParaRPr lang="en-US"/>
+          </a:p>
+        </p:txBody>
+      </p:sp>
+    </p:spTree>
+    <p:extLst>
+      <p:ext uri="{BB962C8B-B14F-4D97-AF65-F5344CB8AC3E}">
+        <p14:creationId xmlns:p14="http://schemas.microsoft.com/office/powerpoint/2010/main" val="857153895"/>
+      </p:ext>
+    </p:extLst>
+  </p:cSld>
+  <p:clrMapOvr>
+    <a:masterClrMapping/>
+  </p:clrMapOvr>
+</p:sld>
+</file>
+
+<file path=ppt/slides/slide6.xml><?xml version="1.0" encoding="utf-8"?>
+<p:sld xmlns:a="http://schemas.openxmlformats.org/drawingml/2006/main" xmlns:r="http://schemas.openxmlformats.org/officeDocument/2006/relationships" xmlns:p="http://schemas.openxmlformats.org/presentationml/2006/main">
+  <p:cSld>
+    <p:spTree>
+      <p:nvGrpSpPr>
+        <p:cNvPr id="1" name=""/>
+        <p:cNvGrpSpPr/>
+        <p:nvPr/>
+      </p:nvGrpSpPr>
+      <p:grpSpPr>
+        <a:xfrm>
+          <a:off x="0" y="0"/>
+          <a:ext cx="0" cy="0"/>
+          <a:chOff x="0" y="0"/>
+          <a:chExt cx="0" cy="0"/>
+        </a:xfrm>
+      </p:grpSpPr>
+      <p:sp>
+        <p:nvSpPr>
+          <p:cNvPr id="2" name="Title 1">
+            <a:extLst>
+              <a:ext uri="{FF2B5EF4-FFF2-40B4-BE49-F238E27FC236}">
                 <a16:creationId xmlns:a16="http://schemas.microsoft.com/office/drawing/2014/main" id="{E8CAF033-005B-F940-93F2-FFE4BD856ECF}"/>
               </a:ext>
             </a:extLst>
@@ -5930,7 +6640,7 @@
           <a:p>
             <a:fld id="{81496180-7CCD-9949-9FC6-636262BC9A7B}" type="slidenum">
               <a:rPr lang="en-US" smtClean="0"/>
-              <a:t>5</a:t>
+              <a:t>6</a:t>
             </a:fld>
             <a:endParaRPr lang="en-US"/>
           </a:p>
@@ -5949,7 +6659,7 @@
 </p:sld>
 </file>
 
-<file path=ppt/slides/slide6.xml><?xml version="1.0" encoding="utf-8"?>
+<file path=ppt/slides/slide7.xml><?xml version="1.0" encoding="utf-8"?>
 <p:sld xmlns:a="http://schemas.openxmlformats.org/drawingml/2006/main" xmlns:r="http://schemas.openxmlformats.org/officeDocument/2006/relationships" xmlns:p="http://schemas.openxmlformats.org/presentationml/2006/main" show="0">
   <p:cSld>
     <p:spTree>
@@ -6103,7 +6813,7 @@
           <a:p>
             <a:fld id="{81496180-7CCD-9949-9FC6-636262BC9A7B}" type="slidenum">
               <a:rPr lang="en-US" smtClean="0"/>
-              <a:t>6</a:t>
+              <a:t>7</a:t>
             </a:fld>
             <a:endParaRPr lang="en-US"/>
           </a:p>
@@ -6113,186 +6823,6 @@
     <p:extLst>
       <p:ext uri="{BB962C8B-B14F-4D97-AF65-F5344CB8AC3E}">
         <p14:creationId xmlns:p14="http://schemas.microsoft.com/office/powerpoint/2010/main" val="2901939487"/>
-      </p:ext>
-    </p:extLst>
-  </p:cSld>
-  <p:clrMapOvr>
-    <a:masterClrMapping/>
-  </p:clrMapOvr>
-</p:sld>
-</file>
-
-<file path=ppt/slides/slide7.xml><?xml version="1.0" encoding="utf-8"?>
-<p:sld xmlns:a="http://schemas.openxmlformats.org/drawingml/2006/main" xmlns:r="http://schemas.openxmlformats.org/officeDocument/2006/relationships" xmlns:p="http://schemas.openxmlformats.org/presentationml/2006/main">
-  <p:cSld>
-    <p:spTree>
-      <p:nvGrpSpPr>
-        <p:cNvPr id="1" name=""/>
-        <p:cNvGrpSpPr/>
-        <p:nvPr/>
-      </p:nvGrpSpPr>
-      <p:grpSpPr>
-        <a:xfrm>
-          <a:off x="0" y="0"/>
-          <a:ext cx="0" cy="0"/>
-          <a:chOff x="0" y="0"/>
-          <a:chExt cx="0" cy="0"/>
-        </a:xfrm>
-      </p:grpSpPr>
-      <p:pic>
-        <p:nvPicPr>
-          <p:cNvPr id="8" name="Content Placeholder 7">
-            <a:extLst>
-              <a:ext uri="{FF2B5EF4-FFF2-40B4-BE49-F238E27FC236}">
-                <a16:creationId xmlns:a16="http://schemas.microsoft.com/office/drawing/2014/main" id="{086BCC93-8253-6C45-B5DB-B732AADCC34D}"/>
-              </a:ext>
-            </a:extLst>
-          </p:cNvPr>
-          <p:cNvPicPr>
-            <a:picLocks noGrp="1" noChangeAspect="1"/>
-          </p:cNvPicPr>
-          <p:nvPr>
-            <p:ph idx="1"/>
-          </p:nvPr>
-        </p:nvPicPr>
-        <p:blipFill>
-          <a:blip r:embed="rId3"/>
-          <a:stretch>
-            <a:fillRect/>
-          </a:stretch>
-        </p:blipFill>
-        <p:spPr>
-          <a:xfrm>
-            <a:off x="513545" y="166021"/>
-            <a:ext cx="7836321" cy="6094917"/>
-          </a:xfrm>
-        </p:spPr>
-      </p:pic>
-      <p:sp>
-        <p:nvSpPr>
-          <p:cNvPr id="4" name="Date Placeholder 3">
-            <a:extLst>
-              <a:ext uri="{FF2B5EF4-FFF2-40B4-BE49-F238E27FC236}">
-                <a16:creationId xmlns:a16="http://schemas.microsoft.com/office/drawing/2014/main" id="{B0B898B3-5ABC-BC48-829D-EFAFA9622F8D}"/>
-              </a:ext>
-            </a:extLst>
-          </p:cNvPr>
-          <p:cNvSpPr>
-            <a:spLocks noGrp="1"/>
-          </p:cNvSpPr>
-          <p:nvPr>
-            <p:ph type="dt" sz="half" idx="10"/>
-          </p:nvPr>
-        </p:nvSpPr>
-        <p:spPr/>
-        <p:txBody>
-          <a:bodyPr/>
-          <a:lstStyle/>
-          <a:p>
-            <a:fld id="{6A15CBF3-736A-FD45-AE47-88A67B03EDF7}" type="datetime1">
-              <a:rPr lang="en-US" smtClean="0"/>
-              <a:t>11/10/2020</a:t>
-            </a:fld>
-            <a:endParaRPr lang="en-US"/>
-          </a:p>
-        </p:txBody>
-      </p:sp>
-      <p:sp>
-        <p:nvSpPr>
-          <p:cNvPr id="5" name="Footer Placeholder 4">
-            <a:extLst>
-              <a:ext uri="{FF2B5EF4-FFF2-40B4-BE49-F238E27FC236}">
-                <a16:creationId xmlns:a16="http://schemas.microsoft.com/office/drawing/2014/main" id="{AB62E9E1-1711-874C-BEE7-6C2CB480001F}"/>
-              </a:ext>
-            </a:extLst>
-          </p:cNvPr>
-          <p:cNvSpPr>
-            <a:spLocks noGrp="1"/>
-          </p:cNvSpPr>
-          <p:nvPr>
-            <p:ph type="ftr" sz="quarter" idx="11"/>
-          </p:nvPr>
-        </p:nvSpPr>
-        <p:spPr/>
-        <p:txBody>
-          <a:bodyPr/>
-          <a:lstStyle/>
-          <a:p>
-            <a:r>
-              <a:rPr lang="en-US"/>
-              <a:t>Mykhaylo Shumko | SM023-08</a:t>
-            </a:r>
-          </a:p>
-        </p:txBody>
-      </p:sp>
-      <p:sp>
-        <p:nvSpPr>
-          <p:cNvPr id="6" name="Slide Number Placeholder 5">
-            <a:extLst>
-              <a:ext uri="{FF2B5EF4-FFF2-40B4-BE49-F238E27FC236}">
-                <a16:creationId xmlns:a16="http://schemas.microsoft.com/office/drawing/2014/main" id="{FDE728F9-EA03-CE4E-81EC-827F8595C15C}"/>
-              </a:ext>
-            </a:extLst>
-          </p:cNvPr>
-          <p:cNvSpPr>
-            <a:spLocks noGrp="1"/>
-          </p:cNvSpPr>
-          <p:nvPr>
-            <p:ph type="sldNum" sz="quarter" idx="12"/>
-          </p:nvPr>
-        </p:nvSpPr>
-        <p:spPr/>
-        <p:txBody>
-          <a:bodyPr/>
-          <a:lstStyle/>
-          <a:p>
-            <a:fld id="{81496180-7CCD-9949-9FC6-636262BC9A7B}" type="slidenum">
-              <a:rPr lang="en-US" smtClean="0"/>
-              <a:t>7</a:t>
-            </a:fld>
-            <a:endParaRPr lang="en-US"/>
-          </a:p>
-        </p:txBody>
-      </p:sp>
-      <p:sp>
-        <p:nvSpPr>
-          <p:cNvPr id="9" name="TextBox 8">
-            <a:extLst>
-              <a:ext uri="{FF2B5EF4-FFF2-40B4-BE49-F238E27FC236}">
-                <a16:creationId xmlns:a16="http://schemas.microsoft.com/office/drawing/2014/main" id="{D1E1D30E-536F-8348-8484-97603BC980E1}"/>
-              </a:ext>
-            </a:extLst>
-          </p:cNvPr>
-          <p:cNvSpPr txBox="1"/>
-          <p:nvPr/>
-        </p:nvSpPr>
-        <p:spPr>
-          <a:xfrm>
-            <a:off x="8904487" y="604684"/>
-            <a:ext cx="3242187" cy="2677656"/>
-          </a:xfrm>
-          <a:prstGeom prst="rect">
-            <a:avLst/>
-          </a:prstGeom>
-          <a:noFill/>
-        </p:spPr>
-        <p:txBody>
-          <a:bodyPr wrap="square" rtlCol="0">
-            <a:spAutoFit/>
-          </a:bodyPr>
-          <a:lstStyle/>
-          <a:p>
-            <a:r>
-              <a:rPr lang="en-US" sz="2400" dirty="0"/>
-              <a:t>Surprisingly, curtains were observed in the bounce loss cone region in the North Atlantic. Any electrons observed here must precipitate within a bounce period.</a:t>
-            </a:r>
-          </a:p>
-        </p:txBody>
-      </p:sp>
-    </p:spTree>
-    <p:extLst>
-      <p:ext uri="{BB962C8B-B14F-4D97-AF65-F5344CB8AC3E}">
-        <p14:creationId xmlns:p14="http://schemas.microsoft.com/office/powerpoint/2010/main" val="2317606664"/>
       </p:ext>
     </p:extLst>
   </p:cSld>
@@ -6429,6 +6959,186 @@
             <a:fld id="{81496180-7CCD-9949-9FC6-636262BC9A7B}" type="slidenum">
               <a:rPr lang="en-US" smtClean="0"/>
               <a:t>8</a:t>
+            </a:fld>
+            <a:endParaRPr lang="en-US"/>
+          </a:p>
+        </p:txBody>
+      </p:sp>
+      <p:sp>
+        <p:nvSpPr>
+          <p:cNvPr id="9" name="TextBox 8">
+            <a:extLst>
+              <a:ext uri="{FF2B5EF4-FFF2-40B4-BE49-F238E27FC236}">
+                <a16:creationId xmlns:a16="http://schemas.microsoft.com/office/drawing/2014/main" id="{D1E1D30E-536F-8348-8484-97603BC980E1}"/>
+              </a:ext>
+            </a:extLst>
+          </p:cNvPr>
+          <p:cNvSpPr txBox="1"/>
+          <p:nvPr/>
+        </p:nvSpPr>
+        <p:spPr>
+          <a:xfrm>
+            <a:off x="8904487" y="604684"/>
+            <a:ext cx="3242187" cy="2677656"/>
+          </a:xfrm>
+          <a:prstGeom prst="rect">
+            <a:avLst/>
+          </a:prstGeom>
+          <a:noFill/>
+        </p:spPr>
+        <p:txBody>
+          <a:bodyPr wrap="square" rtlCol="0">
+            <a:spAutoFit/>
+          </a:bodyPr>
+          <a:lstStyle/>
+          <a:p>
+            <a:r>
+              <a:rPr lang="en-US" sz="2400" dirty="0"/>
+              <a:t>Surprisingly, curtains were observed in the bounce loss cone region in the North Atlantic. Any electrons observed here must precipitate within a bounce period.</a:t>
+            </a:r>
+          </a:p>
+        </p:txBody>
+      </p:sp>
+    </p:spTree>
+    <p:extLst>
+      <p:ext uri="{BB962C8B-B14F-4D97-AF65-F5344CB8AC3E}">
+        <p14:creationId xmlns:p14="http://schemas.microsoft.com/office/powerpoint/2010/main" val="2317606664"/>
+      </p:ext>
+    </p:extLst>
+  </p:cSld>
+  <p:clrMapOvr>
+    <a:masterClrMapping/>
+  </p:clrMapOvr>
+</p:sld>
+</file>
+
+<file path=ppt/slides/slide9.xml><?xml version="1.0" encoding="utf-8"?>
+<p:sld xmlns:a="http://schemas.openxmlformats.org/drawingml/2006/main" xmlns:r="http://schemas.openxmlformats.org/officeDocument/2006/relationships" xmlns:p="http://schemas.openxmlformats.org/presentationml/2006/main">
+  <p:cSld>
+    <p:spTree>
+      <p:nvGrpSpPr>
+        <p:cNvPr id="1" name=""/>
+        <p:cNvGrpSpPr/>
+        <p:nvPr/>
+      </p:nvGrpSpPr>
+      <p:grpSpPr>
+        <a:xfrm>
+          <a:off x="0" y="0"/>
+          <a:ext cx="0" cy="0"/>
+          <a:chOff x="0" y="0"/>
+          <a:chExt cx="0" cy="0"/>
+        </a:xfrm>
+      </p:grpSpPr>
+      <p:pic>
+        <p:nvPicPr>
+          <p:cNvPr id="8" name="Content Placeholder 7">
+            <a:extLst>
+              <a:ext uri="{FF2B5EF4-FFF2-40B4-BE49-F238E27FC236}">
+                <a16:creationId xmlns:a16="http://schemas.microsoft.com/office/drawing/2014/main" id="{086BCC93-8253-6C45-B5DB-B732AADCC34D}"/>
+              </a:ext>
+            </a:extLst>
+          </p:cNvPr>
+          <p:cNvPicPr>
+            <a:picLocks noGrp="1" noChangeAspect="1"/>
+          </p:cNvPicPr>
+          <p:nvPr>
+            <p:ph idx="1"/>
+          </p:nvPr>
+        </p:nvPicPr>
+        <p:blipFill>
+          <a:blip r:embed="rId3"/>
+          <a:stretch>
+            <a:fillRect/>
+          </a:stretch>
+        </p:blipFill>
+        <p:spPr>
+          <a:xfrm>
+            <a:off x="513545" y="166021"/>
+            <a:ext cx="7836321" cy="6094917"/>
+          </a:xfrm>
+        </p:spPr>
+      </p:pic>
+      <p:sp>
+        <p:nvSpPr>
+          <p:cNvPr id="4" name="Date Placeholder 3">
+            <a:extLst>
+              <a:ext uri="{FF2B5EF4-FFF2-40B4-BE49-F238E27FC236}">
+                <a16:creationId xmlns:a16="http://schemas.microsoft.com/office/drawing/2014/main" id="{B0B898B3-5ABC-BC48-829D-EFAFA9622F8D}"/>
+              </a:ext>
+            </a:extLst>
+          </p:cNvPr>
+          <p:cNvSpPr>
+            <a:spLocks noGrp="1"/>
+          </p:cNvSpPr>
+          <p:nvPr>
+            <p:ph type="dt" sz="half" idx="10"/>
+          </p:nvPr>
+        </p:nvSpPr>
+        <p:spPr/>
+        <p:txBody>
+          <a:bodyPr/>
+          <a:lstStyle/>
+          <a:p>
+            <a:fld id="{6A15CBF3-736A-FD45-AE47-88A67B03EDF7}" type="datetime1">
+              <a:rPr lang="en-US" smtClean="0"/>
+              <a:t>11/10/2020</a:t>
+            </a:fld>
+            <a:endParaRPr lang="en-US"/>
+          </a:p>
+        </p:txBody>
+      </p:sp>
+      <p:sp>
+        <p:nvSpPr>
+          <p:cNvPr id="5" name="Footer Placeholder 4">
+            <a:extLst>
+              <a:ext uri="{FF2B5EF4-FFF2-40B4-BE49-F238E27FC236}">
+                <a16:creationId xmlns:a16="http://schemas.microsoft.com/office/drawing/2014/main" id="{AB62E9E1-1711-874C-BEE7-6C2CB480001F}"/>
+              </a:ext>
+            </a:extLst>
+          </p:cNvPr>
+          <p:cNvSpPr>
+            <a:spLocks noGrp="1"/>
+          </p:cNvSpPr>
+          <p:nvPr>
+            <p:ph type="ftr" sz="quarter" idx="11"/>
+          </p:nvPr>
+        </p:nvSpPr>
+        <p:spPr/>
+        <p:txBody>
+          <a:bodyPr/>
+          <a:lstStyle/>
+          <a:p>
+            <a:r>
+              <a:rPr lang="en-US"/>
+              <a:t>Mykhaylo Shumko | SM023-08</a:t>
+            </a:r>
+          </a:p>
+        </p:txBody>
+      </p:sp>
+      <p:sp>
+        <p:nvSpPr>
+          <p:cNvPr id="6" name="Slide Number Placeholder 5">
+            <a:extLst>
+              <a:ext uri="{FF2B5EF4-FFF2-40B4-BE49-F238E27FC236}">
+                <a16:creationId xmlns:a16="http://schemas.microsoft.com/office/drawing/2014/main" id="{FDE728F9-EA03-CE4E-81EC-827F8595C15C}"/>
+              </a:ext>
+            </a:extLst>
+          </p:cNvPr>
+          <p:cNvSpPr>
+            <a:spLocks noGrp="1"/>
+          </p:cNvSpPr>
+          <p:nvPr>
+            <p:ph type="sldNum" sz="quarter" idx="12"/>
+          </p:nvPr>
+        </p:nvSpPr>
+        <p:spPr/>
+        <p:txBody>
+          <a:bodyPr/>
+          <a:lstStyle/>
+          <a:p>
+            <a:fld id="{81496180-7CCD-9949-9FC6-636262BC9A7B}" type="slidenum">
+              <a:rPr lang="en-US" smtClean="0"/>
+              <a:t>9</a:t>
             </a:fld>
             <a:endParaRPr lang="en-US"/>
           </a:p>
@@ -6515,228 +7225,6 @@
     <p:extLst>
       <p:ext uri="{BB962C8B-B14F-4D97-AF65-F5344CB8AC3E}">
         <p14:creationId xmlns:p14="http://schemas.microsoft.com/office/powerpoint/2010/main" val="1255024436"/>
-      </p:ext>
-    </p:extLst>
-  </p:cSld>
-  <p:clrMapOvr>
-    <a:masterClrMapping/>
-  </p:clrMapOvr>
-</p:sld>
-</file>
-
-<file path=ppt/slides/slide9.xml><?xml version="1.0" encoding="utf-8"?>
-<p:sld xmlns:a="http://schemas.openxmlformats.org/drawingml/2006/main" xmlns:r="http://schemas.openxmlformats.org/officeDocument/2006/relationships" xmlns:p="http://schemas.openxmlformats.org/presentationml/2006/main">
-  <p:cSld>
-    <p:spTree>
-      <p:nvGrpSpPr>
-        <p:cNvPr id="1" name=""/>
-        <p:cNvGrpSpPr/>
-        <p:nvPr/>
-      </p:nvGrpSpPr>
-      <p:grpSpPr>
-        <a:xfrm>
-          <a:off x="0" y="0"/>
-          <a:ext cx="0" cy="0"/>
-          <a:chOff x="0" y="0"/>
-          <a:chExt cx="0" cy="0"/>
-        </a:xfrm>
-      </p:grpSpPr>
-      <p:pic>
-        <p:nvPicPr>
-          <p:cNvPr id="8" name="Content Placeholder 7">
-            <a:extLst>
-              <a:ext uri="{FF2B5EF4-FFF2-40B4-BE49-F238E27FC236}">
-                <a16:creationId xmlns:a16="http://schemas.microsoft.com/office/drawing/2014/main" id="{086BCC93-8253-6C45-B5DB-B732AADCC34D}"/>
-              </a:ext>
-            </a:extLst>
-          </p:cNvPr>
-          <p:cNvPicPr>
-            <a:picLocks noGrp="1" noChangeAspect="1"/>
-          </p:cNvPicPr>
-          <p:nvPr>
-            <p:ph idx="1"/>
-          </p:nvPr>
-        </p:nvPicPr>
-        <p:blipFill>
-          <a:blip r:embed="rId3"/>
-          <a:stretch>
-            <a:fillRect/>
-          </a:stretch>
-        </p:blipFill>
-        <p:spPr>
-          <a:xfrm>
-            <a:off x="513545" y="166021"/>
-            <a:ext cx="7836321" cy="6094917"/>
-          </a:xfrm>
-        </p:spPr>
-      </p:pic>
-      <p:sp>
-        <p:nvSpPr>
-          <p:cNvPr id="4" name="Date Placeholder 3">
-            <a:extLst>
-              <a:ext uri="{FF2B5EF4-FFF2-40B4-BE49-F238E27FC236}">
-                <a16:creationId xmlns:a16="http://schemas.microsoft.com/office/drawing/2014/main" id="{B0B898B3-5ABC-BC48-829D-EFAFA9622F8D}"/>
-              </a:ext>
-            </a:extLst>
-          </p:cNvPr>
-          <p:cNvSpPr>
-            <a:spLocks noGrp="1"/>
-          </p:cNvSpPr>
-          <p:nvPr>
-            <p:ph type="dt" sz="half" idx="10"/>
-          </p:nvPr>
-        </p:nvSpPr>
-        <p:spPr/>
-        <p:txBody>
-          <a:bodyPr/>
-          <a:lstStyle/>
-          <a:p>
-            <a:fld id="{6A15CBF3-736A-FD45-AE47-88A67B03EDF7}" type="datetime1">
-              <a:rPr lang="en-US" smtClean="0"/>
-              <a:t>11/10/2020</a:t>
-            </a:fld>
-            <a:endParaRPr lang="en-US"/>
-          </a:p>
-        </p:txBody>
-      </p:sp>
-      <p:sp>
-        <p:nvSpPr>
-          <p:cNvPr id="5" name="Footer Placeholder 4">
-            <a:extLst>
-              <a:ext uri="{FF2B5EF4-FFF2-40B4-BE49-F238E27FC236}">
-                <a16:creationId xmlns:a16="http://schemas.microsoft.com/office/drawing/2014/main" id="{AB62E9E1-1711-874C-BEE7-6C2CB480001F}"/>
-              </a:ext>
-            </a:extLst>
-          </p:cNvPr>
-          <p:cNvSpPr>
-            <a:spLocks noGrp="1"/>
-          </p:cNvSpPr>
-          <p:nvPr>
-            <p:ph type="ftr" sz="quarter" idx="11"/>
-          </p:nvPr>
-        </p:nvSpPr>
-        <p:spPr/>
-        <p:txBody>
-          <a:bodyPr/>
-          <a:lstStyle/>
-          <a:p>
-            <a:r>
-              <a:rPr lang="en-US"/>
-              <a:t>Mykhaylo Shumko | SM023-08</a:t>
-            </a:r>
-          </a:p>
-        </p:txBody>
-      </p:sp>
-      <p:sp>
-        <p:nvSpPr>
-          <p:cNvPr id="6" name="Slide Number Placeholder 5">
-            <a:extLst>
-              <a:ext uri="{FF2B5EF4-FFF2-40B4-BE49-F238E27FC236}">
-                <a16:creationId xmlns:a16="http://schemas.microsoft.com/office/drawing/2014/main" id="{FDE728F9-EA03-CE4E-81EC-827F8595C15C}"/>
-              </a:ext>
-            </a:extLst>
-          </p:cNvPr>
-          <p:cNvSpPr>
-            <a:spLocks noGrp="1"/>
-          </p:cNvSpPr>
-          <p:nvPr>
-            <p:ph type="sldNum" sz="quarter" idx="12"/>
-          </p:nvPr>
-        </p:nvSpPr>
-        <p:spPr/>
-        <p:txBody>
-          <a:bodyPr/>
-          <a:lstStyle/>
-          <a:p>
-            <a:fld id="{81496180-7CCD-9949-9FC6-636262BC9A7B}" type="slidenum">
-              <a:rPr lang="en-US" smtClean="0"/>
-              <a:t>9</a:t>
-            </a:fld>
-            <a:endParaRPr lang="en-US"/>
-          </a:p>
-        </p:txBody>
-      </p:sp>
-      <p:sp>
-        <p:nvSpPr>
-          <p:cNvPr id="9" name="TextBox 8">
-            <a:extLst>
-              <a:ext uri="{FF2B5EF4-FFF2-40B4-BE49-F238E27FC236}">
-                <a16:creationId xmlns:a16="http://schemas.microsoft.com/office/drawing/2014/main" id="{D1E1D30E-536F-8348-8484-97603BC980E1}"/>
-              </a:ext>
-            </a:extLst>
-          </p:cNvPr>
-          <p:cNvSpPr txBox="1"/>
-          <p:nvPr/>
-        </p:nvSpPr>
-        <p:spPr>
-          <a:xfrm>
-            <a:off x="8904487" y="604684"/>
-            <a:ext cx="3242187" cy="2677656"/>
-          </a:xfrm>
-          <a:prstGeom prst="rect">
-            <a:avLst/>
-          </a:prstGeom>
-          <a:noFill/>
-        </p:spPr>
-        <p:txBody>
-          <a:bodyPr wrap="square" rtlCol="0">
-            <a:spAutoFit/>
-          </a:bodyPr>
-          <a:lstStyle/>
-          <a:p>
-            <a:r>
-              <a:rPr lang="en-US" sz="2400" dirty="0"/>
-              <a:t>Surprisingly, curtains were observed in the bounce loss cone region in the North Atlantic. Any electrons observed here must precipitate within a bounce period.</a:t>
-            </a:r>
-          </a:p>
-        </p:txBody>
-      </p:sp>
-      <p:cxnSp>
-        <p:nvCxnSpPr>
-          <p:cNvPr id="7" name="Straight Arrow Connector 6">
-            <a:extLst>
-              <a:ext uri="{FF2B5EF4-FFF2-40B4-BE49-F238E27FC236}">
-                <a16:creationId xmlns:a16="http://schemas.microsoft.com/office/drawing/2014/main" id="{F35A387D-7F78-414A-959B-D439CB7AEA17}"/>
-              </a:ext>
-            </a:extLst>
-          </p:cNvPr>
-          <p:cNvCxnSpPr/>
-          <p:nvPr/>
-        </p:nvCxnSpPr>
-        <p:spPr>
-          <a:xfrm>
-            <a:off x="922610" y="2110889"/>
-            <a:ext cx="1150374" cy="471948"/>
-          </a:xfrm>
-          <a:prstGeom prst="straightConnector1">
-            <a:avLst/>
-          </a:prstGeom>
-          <a:ln w="76200">
-            <a:solidFill>
-              <a:srgbClr val="FF0000"/>
-            </a:solidFill>
-            <a:tailEnd type="triangle"/>
-          </a:ln>
-        </p:spPr>
-        <p:style>
-          <a:lnRef idx="1">
-            <a:schemeClr val="accent1"/>
-          </a:lnRef>
-          <a:fillRef idx="0">
-            <a:schemeClr val="accent1"/>
-          </a:fillRef>
-          <a:effectRef idx="0">
-            <a:schemeClr val="accent1"/>
-          </a:effectRef>
-          <a:fontRef idx="minor">
-            <a:schemeClr val="tx1"/>
-          </a:fontRef>
-        </p:style>
-      </p:cxnSp>
-    </p:spTree>
-    <p:extLst>
-      <p:ext uri="{BB962C8B-B14F-4D97-AF65-F5344CB8AC3E}">
-        <p14:creationId xmlns:p14="http://schemas.microsoft.com/office/powerpoint/2010/main" val="3700542300"/>
       </p:ext>
     </p:extLst>
   </p:cSld>

</xml_diff>